<commit_message>
revise the variance error from the web example
</commit_message>
<xml_diff>
--- a/Lecture 3- Measure of Dispersion/Lecture 3- Measure of Dispersion.pptx
+++ b/Lecture 3- Measure of Dispersion/Lecture 3- Measure of Dispersion.pptx
@@ -132,7 +132,7 @@
   </p:defaultTextStyle>
   <p:extLst>
     <p:ext uri="{EFAFB233-063F-42B5-8137-9DF3F51BA10A}">
-      <p15:sldGuideLst xmlns:p15="http://schemas.microsoft.com/office/powerpoint/2012/main">
+      <p15:sldGuideLst xmlns:p15="http://schemas.microsoft.com/office/powerpoint/2012/main" xmlns="">
         <p15:guide id="1" orient="horz" pos="2160">
           <p15:clr>
             <a:srgbClr val="A4A3A4"/>
@@ -231,7 +231,7 @@
           <a:p>
             <a:fld id="{BC2C9D67-2894-46E8-A621-C43BB8A942DE}" type="datetimeFigureOut">
               <a:rPr lang="en-US" smtClean="0"/>
-              <a:t>1/29/18</a:t>
+              <a:t>1/30/18</a:t>
             </a:fld>
             <a:endParaRPr lang="en-US"/>
           </a:p>
@@ -396,7 +396,7 @@
           <a:p>
             <a:fld id="{22FED149-BAF0-4A18-86DF-12A2D0010507}" type="datetimeFigureOut">
               <a:rPr lang="en-US" smtClean="0"/>
-              <a:t>1/29/18</a:t>
+              <a:t>1/30/18</a:t>
             </a:fld>
             <a:endParaRPr lang="en-US"/>
           </a:p>
@@ -1544,7 +1544,7 @@
           <a:p>
             <a:fld id="{387AFFB7-327E-4244-BF99-9EC937550CC8}" type="datetime1">
               <a:rPr lang="en-US" smtClean="0"/>
-              <a:t>1/29/18</a:t>
+              <a:t>1/30/18</a:t>
             </a:fld>
             <a:endParaRPr lang="en-US"/>
           </a:p>
@@ -1712,7 +1712,7 @@
           <a:p>
             <a:fld id="{78509075-CBA1-0148-815B-229E0E0ED975}" type="datetime1">
               <a:rPr lang="en-US" smtClean="0"/>
-              <a:t>1/29/18</a:t>
+              <a:t>1/30/18</a:t>
             </a:fld>
             <a:endParaRPr lang="en-US"/>
           </a:p>
@@ -1890,7 +1890,7 @@
           <a:p>
             <a:fld id="{B19CC703-417E-AC4D-B8B0-F8BFFF55B67F}" type="datetime1">
               <a:rPr lang="en-US" smtClean="0"/>
-              <a:t>1/29/18</a:t>
+              <a:t>1/30/18</a:t>
             </a:fld>
             <a:endParaRPr lang="en-US"/>
           </a:p>
@@ -2058,7 +2058,7 @@
           <a:p>
             <a:fld id="{3F8851D0-A4C8-EA45-98EB-437854DD1D1A}" type="datetime1">
               <a:rPr lang="en-US" smtClean="0"/>
-              <a:t>1/29/18</a:t>
+              <a:t>1/30/18</a:t>
             </a:fld>
             <a:endParaRPr lang="en-US"/>
           </a:p>
@@ -2303,7 +2303,7 @@
           <a:p>
             <a:fld id="{7DD8A815-1B75-914C-BC24-DC6A4DAE0827}" type="datetime1">
               <a:rPr lang="en-US" smtClean="0"/>
-              <a:t>1/29/18</a:t>
+              <a:t>1/30/18</a:t>
             </a:fld>
             <a:endParaRPr lang="en-US"/>
           </a:p>
@@ -2588,7 +2588,7 @@
           <a:p>
             <a:fld id="{FEC03772-402C-8048-8FCC-16AB8C74EC67}" type="datetime1">
               <a:rPr lang="en-US" smtClean="0"/>
-              <a:t>1/29/18</a:t>
+              <a:t>1/30/18</a:t>
             </a:fld>
             <a:endParaRPr lang="en-US"/>
           </a:p>
@@ -3007,7 +3007,7 @@
           <a:p>
             <a:fld id="{7B6DB347-E9DB-604D-8E45-00ABBE2BF3E1}" type="datetime1">
               <a:rPr lang="en-US" smtClean="0"/>
-              <a:t>1/29/18</a:t>
+              <a:t>1/30/18</a:t>
             </a:fld>
             <a:endParaRPr lang="en-US"/>
           </a:p>
@@ -3124,7 +3124,7 @@
           <a:p>
             <a:fld id="{30B0D79E-3FF4-C04C-B396-76602DF43FF7}" type="datetime1">
               <a:rPr lang="en-US" smtClean="0"/>
-              <a:t>1/29/18</a:t>
+              <a:t>1/30/18</a:t>
             </a:fld>
             <a:endParaRPr lang="en-US"/>
           </a:p>
@@ -3219,7 +3219,7 @@
           <a:p>
             <a:fld id="{47730428-692E-B34F-9E5C-D4DEECDC384F}" type="datetime1">
               <a:rPr lang="en-US" smtClean="0"/>
-              <a:t>1/29/18</a:t>
+              <a:t>1/30/18</a:t>
             </a:fld>
             <a:endParaRPr lang="en-US"/>
           </a:p>
@@ -3494,7 +3494,7 @@
           <a:p>
             <a:fld id="{4D76951C-75D2-794D-8F9B-9036B45AB683}" type="datetime1">
               <a:rPr lang="en-US" smtClean="0"/>
-              <a:t>1/29/18</a:t>
+              <a:t>1/30/18</a:t>
             </a:fld>
             <a:endParaRPr lang="en-US"/>
           </a:p>
@@ -3746,7 +3746,7 @@
           <a:p>
             <a:fld id="{7B76F858-7D35-A448-B378-D6CD46B1BD89}" type="datetime1">
               <a:rPr lang="en-US" smtClean="0"/>
-              <a:t>1/29/18</a:t>
+              <a:t>1/30/18</a:t>
             </a:fld>
             <a:endParaRPr lang="en-US"/>
           </a:p>
@@ -3957,7 +3957,7 @@
           <a:p>
             <a:fld id="{EA946669-154F-F947-B4D6-A8687781ABE6}" type="datetime1">
               <a:rPr lang="en-US" smtClean="0"/>
-              <a:t>1/29/18</a:t>
+              <a:t>1/30/18</a:t>
             </a:fld>
             <a:endParaRPr lang="en-US"/>
           </a:p>
@@ -4384,7 +4384,7 @@
           <a:lstStyle/>
           <a:p>
             <a:r>
-              <a:rPr lang="en-US" altLang="zh-Hans" dirty="0">
+              <a:rPr lang="en-US" altLang="zh-CHS" dirty="0">
                 <a:solidFill>
                   <a:srgbClr val="898989"/>
                 </a:solidFill>
@@ -4393,7 +4393,7 @@
               <a:t>Jibo</a:t>
             </a:r>
             <a:r>
-              <a:rPr lang="zh-Hans" altLang="en-US" dirty="0">
+              <a:rPr lang="zh-CHS" altLang="en-US" dirty="0">
                 <a:solidFill>
                   <a:srgbClr val="898989"/>
                 </a:solidFill>
@@ -4402,7 +4402,7 @@
               <a:t> </a:t>
             </a:r>
             <a:r>
-              <a:rPr lang="en-US" altLang="zh-Hans" dirty="0">
+              <a:rPr lang="en-US" altLang="zh-CHS" dirty="0">
                 <a:solidFill>
                   <a:srgbClr val="898989"/>
                 </a:solidFill>
@@ -4411,7 +4411,7 @@
               <a:t>He,</a:t>
             </a:r>
             <a:r>
-              <a:rPr lang="zh-Hans" altLang="en-US" dirty="0">
+              <a:rPr lang="zh-CHS" altLang="en-US" dirty="0">
                 <a:solidFill>
                   <a:srgbClr val="898989"/>
                 </a:solidFill>
@@ -4420,7 +4420,7 @@
               <a:t> </a:t>
             </a:r>
             <a:r>
-              <a:rPr lang="en-US" altLang="zh-Hans" dirty="0">
+              <a:rPr lang="en-US" altLang="zh-CHS" dirty="0">
                 <a:solidFill>
                   <a:srgbClr val="898989"/>
                 </a:solidFill>
@@ -4431,7 +4431,7 @@
           </a:p>
           <a:p>
             <a:r>
-              <a:rPr lang="en-US" altLang="zh-Hans" dirty="0">
+              <a:rPr lang="en-US" altLang="zh-CHS" dirty="0">
                 <a:solidFill>
                   <a:srgbClr val="898989"/>
                 </a:solidFill>
@@ -4440,7 +4440,7 @@
               <a:t>Associate</a:t>
             </a:r>
             <a:r>
-              <a:rPr lang="zh-Hans" altLang="en-US" dirty="0">
+              <a:rPr lang="zh-CHS" altLang="en-US" dirty="0">
                 <a:solidFill>
                   <a:srgbClr val="898989"/>
                 </a:solidFill>
@@ -4449,7 +4449,7 @@
               <a:t> </a:t>
             </a:r>
             <a:r>
-              <a:rPr lang="en-US" altLang="zh-Hans" dirty="0">
+              <a:rPr lang="en-US" altLang="zh-CHS" dirty="0">
                 <a:solidFill>
                   <a:srgbClr val="898989"/>
                 </a:solidFill>
@@ -4460,7 +4460,7 @@
           </a:p>
           <a:p>
             <a:r>
-              <a:rPr lang="en-US" altLang="zh-Hans" dirty="0">
+              <a:rPr lang="en-US" altLang="zh-CHS" dirty="0">
                 <a:solidFill>
                   <a:srgbClr val="898989"/>
                 </a:solidFill>
@@ -4469,7 +4469,7 @@
               <a:t>Wichita</a:t>
             </a:r>
             <a:r>
-              <a:rPr lang="zh-Hans" altLang="en-US" dirty="0">
+              <a:rPr lang="zh-CHS" altLang="en-US" dirty="0">
                 <a:solidFill>
                   <a:srgbClr val="898989"/>
                 </a:solidFill>
@@ -4478,7 +4478,7 @@
               <a:t> </a:t>
             </a:r>
             <a:r>
-              <a:rPr lang="en-US" altLang="zh-Hans" dirty="0">
+              <a:rPr lang="en-US" altLang="zh-CHS" dirty="0">
                 <a:solidFill>
                   <a:srgbClr val="898989"/>
                 </a:solidFill>
@@ -4487,7 +4487,7 @@
               <a:t>State</a:t>
             </a:r>
             <a:r>
-              <a:rPr lang="zh-Hans" altLang="en-US" dirty="0">
+              <a:rPr lang="zh-CHS" altLang="en-US" dirty="0">
                 <a:solidFill>
                   <a:srgbClr val="898989"/>
                 </a:solidFill>
@@ -4496,7 +4496,7 @@
               <a:t> </a:t>
             </a:r>
             <a:r>
-              <a:rPr lang="en-US" altLang="zh-Hans" dirty="0">
+              <a:rPr lang="en-US" altLang="zh-CHS" dirty="0">
                 <a:solidFill>
                   <a:srgbClr val="898989"/>
                 </a:solidFill>
@@ -4507,7 +4507,7 @@
           </a:p>
           <a:p>
             <a:r>
-              <a:rPr lang="en-US" altLang="zh-Hans" dirty="0" err="1">
+              <a:rPr lang="en-US" altLang="zh-CHS" dirty="0" err="1">
                 <a:solidFill>
                   <a:srgbClr val="898989"/>
                 </a:solidFill>
@@ -4529,7 +4529,7 @@
           <p:cNvPr id="4" name="Slide Number Placeholder 3">
             <a:extLst>
               <a:ext uri="{FF2B5EF4-FFF2-40B4-BE49-F238E27FC236}">
-                <a16:creationId xmlns:a16="http://schemas.microsoft.com/office/drawing/2014/main" id="{04B5A287-4E1A-544D-A8CA-306FA13AA340}"/>
+                <a16:creationId xmlns:a16="http://schemas.microsoft.com/office/drawing/2014/main" xmlns="" id="{04B5A287-4E1A-544D-A8CA-306FA13AA340}"/>
               </a:ext>
             </a:extLst>
           </p:cNvPr>
@@ -4818,7 +4818,7 @@
           <a:graphicData uri="http://schemas.openxmlformats.org/presentationml/2006/ole">
             <mc:AlternateContent xmlns:mc="http://schemas.openxmlformats.org/markup-compatibility/2006">
               <mc:Choice xmlns:v="urn:schemas-microsoft-com:vml" Requires="v">
-                <p:oleObj spid="_x0000_s14648" name="Equation" r:id="rId4" imgW="596880" imgH="279360" progId="Equation.DSMT4">
+                <p:oleObj spid="_x0000_s14663" name="Equation" r:id="rId4" imgW="596880" imgH="279360" progId="Equation.DSMT4">
                   <p:embed/>
                 </p:oleObj>
               </mc:Choice>
@@ -4856,7 +4856,7 @@
                       </a:prstGeom>
                       <a:noFill/>
                       <a:extLst>
-                        <a:ext uri="{909E8E84-426E-40DD-AFC4-6F175D3DCCD1}">
+                        <a:ext uri="{909E8E84-426E-40dd-AFC4-6F175D3DCCD1}">
                           <a14:hiddenFill xmlns:a14="http://schemas.microsoft.com/office/drawing/2010/main">
                             <a:solidFill>
                               <a:srgbClr val="FFFFFF"/>
@@ -4894,7 +4894,7 @@
           <a:graphicData uri="http://schemas.openxmlformats.org/presentationml/2006/ole">
             <mc:AlternateContent xmlns:mc="http://schemas.openxmlformats.org/markup-compatibility/2006">
               <mc:Choice xmlns:v="urn:schemas-microsoft-com:vml" Requires="v">
-                <p:oleObj spid="_x0000_s14649" name="Equation" r:id="rId6" imgW="799920" imgH="609480" progId="Equation.DSMT4">
+                <p:oleObj spid="_x0000_s14664" name="Equation" r:id="rId6" imgW="799920" imgH="609480" progId="Equation.DSMT4">
                   <p:embed/>
                 </p:oleObj>
               </mc:Choice>
@@ -4926,7 +4926,7 @@
                       </a:prstGeom>
                       <a:noFill/>
                       <a:extLst>
-                        <a:ext uri="{909E8E84-426E-40DD-AFC4-6F175D3DCCD1}">
+                        <a:ext uri="{909E8E84-426E-40dd-AFC4-6F175D3DCCD1}">
                           <a14:hiddenFill xmlns:a14="http://schemas.microsoft.com/office/drawing/2010/main">
                             <a:solidFill>
                               <a:srgbClr val="FFFFFF"/>
@@ -4947,7 +4947,7 @@
           <p:cNvPr id="4" name="Slide Number Placeholder 3">
             <a:extLst>
               <a:ext uri="{FF2B5EF4-FFF2-40B4-BE49-F238E27FC236}">
-                <a16:creationId xmlns:a16="http://schemas.microsoft.com/office/drawing/2014/main" id="{8BFA34C6-E215-4C48-AEAB-567546E18F87}"/>
+                <a16:creationId xmlns:a16="http://schemas.microsoft.com/office/drawing/2014/main" xmlns="" id="{8BFA34C6-E215-4C48-AEAB-567546E18F87}"/>
               </a:ext>
             </a:extLst>
           </p:cNvPr>
@@ -4984,7 +4984,7 @@
   <p:timing>
     <p:tnLst>
       <p:par>
-        <p:cTn id="1" dur="indefinite" restart="never" nodeType="tmRoot">
+        <p:cTn xmlns:p14="http://schemas.microsoft.com/office/powerpoint/2010/main" id="1" dur="indefinite" restart="never" nodeType="tmRoot">
           <p:childTnLst>
             <p:seq concurrent="1" nextAc="seek">
               <p:cTn id="2" dur="indefinite" nodeType="mainSeq">
@@ -5495,7 +5495,7 @@
           <a:graphicData uri="http://schemas.openxmlformats.org/presentationml/2006/ole">
             <mc:AlternateContent xmlns:mc="http://schemas.openxmlformats.org/markup-compatibility/2006">
               <mc:Choice xmlns:v="urn:schemas-microsoft-com:vml" Requires="v">
-                <p:oleObj spid="_x0000_s17694" name="Equation" r:id="rId4" imgW="736560" imgH="609480" progId="Equation.DSMT4">
+                <p:oleObj spid="_x0000_s17709" name="Equation" r:id="rId4" imgW="736560" imgH="609480" progId="Equation.DSMT4">
                   <p:embed/>
                 </p:oleObj>
               </mc:Choice>
@@ -5557,7 +5557,7 @@
           <a:graphicData uri="http://schemas.openxmlformats.org/presentationml/2006/ole">
             <mc:AlternateContent xmlns:mc="http://schemas.openxmlformats.org/markup-compatibility/2006">
               <mc:Choice xmlns:v="urn:schemas-microsoft-com:vml" Requires="v">
-                <p:oleObj spid="_x0000_s17695" name="Equation" r:id="rId6" imgW="1155600" imgH="431640" progId="Equation.DSMT4">
+                <p:oleObj spid="_x0000_s17710" name="Equation" r:id="rId6" imgW="1155600" imgH="431640" progId="Equation.DSMT4">
                   <p:embed/>
                 </p:oleObj>
               </mc:Choice>
@@ -5602,7 +5602,7 @@
           <p:cNvPr id="4" name="Slide Number Placeholder 3">
             <a:extLst>
               <a:ext uri="{FF2B5EF4-FFF2-40B4-BE49-F238E27FC236}">
-                <a16:creationId xmlns:a16="http://schemas.microsoft.com/office/drawing/2014/main" id="{EAAB81A8-A5D3-1144-B066-233E58E0932B}"/>
+                <a16:creationId xmlns:a16="http://schemas.microsoft.com/office/drawing/2014/main" xmlns="" id="{EAAB81A8-A5D3-1144-B066-233E58E0932B}"/>
               </a:ext>
             </a:extLst>
           </p:cNvPr>
@@ -5639,7 +5639,7 @@
   <p:timing>
     <p:tnLst>
       <p:par>
-        <p:cTn id="1" dur="indefinite" restart="never" nodeType="tmRoot">
+        <p:cTn xmlns:p14="http://schemas.microsoft.com/office/powerpoint/2010/main" id="1" dur="indefinite" restart="never" nodeType="tmRoot">
           <p:childTnLst>
             <p:seq concurrent="1" nextAc="seek">
               <p:cTn id="2" dur="indefinite" nodeType="mainSeq">
@@ -6095,7 +6095,7 @@
           <a:graphicData uri="http://schemas.openxmlformats.org/presentationml/2006/ole">
             <mc:AlternateContent xmlns:mc="http://schemas.openxmlformats.org/markup-compatibility/2006">
               <mc:Choice xmlns:v="urn:schemas-microsoft-com:vml" Requires="v">
-                <p:oleObj spid="_x0000_s15673" name="Equation" r:id="rId4" imgW="3517560" imgH="609480" progId="Equation.DSMT4">
+                <p:oleObj spid="_x0000_s15688" name="Equation" r:id="rId4" imgW="3517560" imgH="609480" progId="Equation.DSMT4">
                   <p:embed/>
                 </p:oleObj>
               </mc:Choice>
@@ -6130,14 +6130,14 @@
                         <a:noFill/>
                       </a:ln>
                       <a:extLst>
-                        <a:ext uri="{909E8E84-426E-40DD-AFC4-6F175D3DCCD1}">
+                        <a:ext uri="{909E8E84-426E-40dd-AFC4-6F175D3DCCD1}">
                           <a14:hiddenFill xmlns:a14="http://schemas.microsoft.com/office/drawing/2010/main">
                             <a:solidFill>
                               <a:srgbClr val="FFFFFF"/>
                             </a:solidFill>
                           </a14:hiddenFill>
                         </a:ext>
-                        <a:ext uri="{91240B29-F687-4F45-9708-019B960494DF}">
+                        <a:ext uri="{91240B29-F687-4f45-9708-019B960494DF}">
                           <a14:hiddenLine xmlns:a14="http://schemas.microsoft.com/office/drawing/2010/main" w="9525">
                             <a:solidFill>
                               <a:srgbClr val="000000"/>
@@ -6178,7 +6178,7 @@
           <a:graphicData uri="http://schemas.openxmlformats.org/presentationml/2006/ole">
             <mc:AlternateContent xmlns:mc="http://schemas.openxmlformats.org/markup-compatibility/2006">
               <mc:Choice xmlns:v="urn:schemas-microsoft-com:vml" Requires="v">
-                <p:oleObj spid="_x0000_s15674" name="Equation" r:id="rId6" imgW="1638000" imgH="660240" progId="Equation.DSMT4">
+                <p:oleObj spid="_x0000_s15689" name="Equation" r:id="rId6" imgW="1638000" imgH="660240" progId="Equation.DSMT4">
                   <p:embed/>
                 </p:oleObj>
               </mc:Choice>
@@ -6213,14 +6213,14 @@
                         <a:noFill/>
                       </a:ln>
                       <a:extLst>
-                        <a:ext uri="{909E8E84-426E-40DD-AFC4-6F175D3DCCD1}">
+                        <a:ext uri="{909E8E84-426E-40dd-AFC4-6F175D3DCCD1}">
                           <a14:hiddenFill xmlns:a14="http://schemas.microsoft.com/office/drawing/2010/main">
                             <a:solidFill>
                               <a:srgbClr val="FFFFFF"/>
                             </a:solidFill>
                           </a14:hiddenFill>
                         </a:ext>
-                        <a:ext uri="{91240B29-F687-4F45-9708-019B960494DF}">
+                        <a:ext uri="{91240B29-F687-4f45-9708-019B960494DF}">
                           <a14:hiddenLine xmlns:a14="http://schemas.microsoft.com/office/drawing/2010/main" w="9525">
                             <a:solidFill>
                               <a:srgbClr val="000000"/>
@@ -6244,7 +6244,7 @@
           <p:cNvPr id="4" name="Slide Number Placeholder 3">
             <a:extLst>
               <a:ext uri="{FF2B5EF4-FFF2-40B4-BE49-F238E27FC236}">
-                <a16:creationId xmlns:a16="http://schemas.microsoft.com/office/drawing/2014/main" id="{BFEF2904-E5F8-5C43-9451-AC6B9FE1C84E}"/>
+                <a16:creationId xmlns:a16="http://schemas.microsoft.com/office/drawing/2014/main" xmlns="" id="{BFEF2904-E5F8-5C43-9451-AC6B9FE1C84E}"/>
               </a:ext>
             </a:extLst>
           </p:cNvPr>
@@ -6503,7 +6503,7 @@
           <a:graphicData uri="http://schemas.openxmlformats.org/presentationml/2006/ole">
             <mc:AlternateContent xmlns:mc="http://schemas.openxmlformats.org/markup-compatibility/2006">
               <mc:Choice xmlns:v="urn:schemas-microsoft-com:vml" Requires="v">
-                <p:oleObj spid="_x0000_s16697" name="Equation" r:id="rId4" imgW="3568680" imgH="609480" progId="Equation.DSMT4">
+                <p:oleObj spid="_x0000_s16712" name="Equation" r:id="rId4" imgW="3568680" imgH="609480" progId="Equation.DSMT4">
                   <p:embed/>
                 </p:oleObj>
               </mc:Choice>
@@ -6538,14 +6538,14 @@
                         <a:noFill/>
                       </a:ln>
                       <a:extLst>
-                        <a:ext uri="{909E8E84-426E-40DD-AFC4-6F175D3DCCD1}">
+                        <a:ext uri="{909E8E84-426E-40dd-AFC4-6F175D3DCCD1}">
                           <a14:hiddenFill xmlns:a14="http://schemas.microsoft.com/office/drawing/2010/main">
                             <a:solidFill>
                               <a:srgbClr val="FFFFFF"/>
                             </a:solidFill>
                           </a14:hiddenFill>
                         </a:ext>
-                        <a:ext uri="{91240B29-F687-4F45-9708-019B960494DF}">
+                        <a:ext uri="{91240B29-F687-4f45-9708-019B960494DF}">
                           <a14:hiddenLine xmlns:a14="http://schemas.microsoft.com/office/drawing/2010/main" w="9525">
                             <a:solidFill>
                               <a:srgbClr val="000000"/>
@@ -6586,7 +6586,7 @@
           <a:graphicData uri="http://schemas.openxmlformats.org/presentationml/2006/ole">
             <mc:AlternateContent xmlns:mc="http://schemas.openxmlformats.org/markup-compatibility/2006">
               <mc:Choice xmlns:v="urn:schemas-microsoft-com:vml" Requires="v">
-                <p:oleObj spid="_x0000_s16698" name="Equation" r:id="rId6" imgW="1600200" imgH="660240" progId="Equation.DSMT4">
+                <p:oleObj spid="_x0000_s16713" name="Equation" r:id="rId6" imgW="1600200" imgH="660240" progId="Equation.DSMT4">
                   <p:embed/>
                 </p:oleObj>
               </mc:Choice>
@@ -6621,14 +6621,14 @@
                         <a:noFill/>
                       </a:ln>
                       <a:extLst>
-                        <a:ext uri="{909E8E84-426E-40DD-AFC4-6F175D3DCCD1}">
+                        <a:ext uri="{909E8E84-426E-40dd-AFC4-6F175D3DCCD1}">
                           <a14:hiddenFill xmlns:a14="http://schemas.microsoft.com/office/drawing/2010/main">
                             <a:solidFill>
                               <a:srgbClr val="FFFFFF"/>
                             </a:solidFill>
                           </a14:hiddenFill>
                         </a:ext>
-                        <a:ext uri="{91240B29-F687-4F45-9708-019B960494DF}">
+                        <a:ext uri="{91240B29-F687-4f45-9708-019B960494DF}">
                           <a14:hiddenLine xmlns:a14="http://schemas.microsoft.com/office/drawing/2010/main" w="9525">
                             <a:solidFill>
                               <a:srgbClr val="000000"/>
@@ -6775,14 +6775,14 @@
           </a:ln>
           <a:effectLst/>
           <a:extLst>
-            <a:ext uri="{909E8E84-426E-40DD-AFC4-6F175D3DCCD1}">
+            <a:ext uri="{909E8E84-426E-40dd-AFC4-6F175D3DCCD1}">
               <a14:hiddenFill xmlns:a14="http://schemas.microsoft.com/office/drawing/2010/main">
                 <a:solidFill>
                   <a:schemeClr val="accent1"/>
                 </a:solidFill>
               </a14:hiddenFill>
             </a:ext>
-            <a:ext uri="{AF507438-7753-43E0-B8FC-AC1667EBCBE1}">
+            <a:ext uri="{AF507438-7753-43e0-B8FC-AC1667EBCBE1}">
               <a14:hiddenEffects xmlns:a14="http://schemas.microsoft.com/office/drawing/2010/main">
                 <a:effectLst>
                   <a:outerShdw blurRad="63500" dist="38099" dir="2700000" algn="ctr" rotWithShape="0">
@@ -6810,7 +6810,7 @@
           <p:cNvPr id="5" name="Slide Number Placeholder 4">
             <a:extLst>
               <a:ext uri="{FF2B5EF4-FFF2-40B4-BE49-F238E27FC236}">
-                <a16:creationId xmlns:a16="http://schemas.microsoft.com/office/drawing/2014/main" id="{789B64CC-22E7-6F46-846A-88B3AB3A6FC1}"/>
+                <a16:creationId xmlns:a16="http://schemas.microsoft.com/office/drawing/2014/main" xmlns="" id="{789B64CC-22E7-6F46-846A-88B3AB3A6FC1}"/>
               </a:ext>
             </a:extLst>
           </p:cNvPr>
@@ -6847,7 +6847,7 @@
   <p:timing>
     <p:tnLst>
       <p:par>
-        <p:cTn id="1" dur="indefinite" restart="never" nodeType="tmRoot">
+        <p:cTn xmlns:p14="http://schemas.microsoft.com/office/powerpoint/2010/main" id="1" dur="indefinite" restart="never" nodeType="tmRoot">
           <p:childTnLst>
             <p:seq concurrent="1" nextAc="seek">
               <p:cTn id="2" dur="indefinite" nodeType="mainSeq">
@@ -6947,7 +6947,7 @@
           <p:cNvPr id="2" name="Title 1">
             <a:extLst>
               <a:ext uri="{FF2B5EF4-FFF2-40B4-BE49-F238E27FC236}">
-                <a16:creationId xmlns:a16="http://schemas.microsoft.com/office/drawing/2014/main" id="{107F04A5-2F9A-AF48-823B-250BC8028176}"/>
+                <a16:creationId xmlns:a16="http://schemas.microsoft.com/office/drawing/2014/main" xmlns="" id="{107F04A5-2F9A-AF48-823B-250BC8028176}"/>
               </a:ext>
             </a:extLst>
           </p:cNvPr>
@@ -6970,7 +6970,7 @@
               <a:t>How to find the variance "by hand”</a:t>
             </a:r>
             <a:r>
-              <a:rPr lang="en-US" altLang="zh-Hans" b="1" dirty="0"/>
+              <a:rPr lang="en-US" altLang="zh-CHS" b="1" dirty="0"/>
               <a:t>?</a:t>
             </a:r>
             <a:endParaRPr lang="en-US" dirty="0"/>
@@ -6982,7 +6982,7 @@
           <p:cNvPr id="3" name="Content Placeholder 2">
             <a:extLst>
               <a:ext uri="{FF2B5EF4-FFF2-40B4-BE49-F238E27FC236}">
-                <a16:creationId xmlns:a16="http://schemas.microsoft.com/office/drawing/2014/main" id="{284BF116-83F2-A747-BD99-DD0F95B4A73B}"/>
+                <a16:creationId xmlns:a16="http://schemas.microsoft.com/office/drawing/2014/main" xmlns="" id="{284BF116-83F2-A747-BD99-DD0F95B4A73B}"/>
               </a:ext>
             </a:extLst>
           </p:cNvPr>
@@ -7061,7 +7061,7 @@
           <p:cNvPr id="4" name="Slide Number Placeholder 3">
             <a:extLst>
               <a:ext uri="{FF2B5EF4-FFF2-40B4-BE49-F238E27FC236}">
-                <a16:creationId xmlns:a16="http://schemas.microsoft.com/office/drawing/2014/main" id="{77969D13-3FAD-5E4E-BA70-A1F965B26E6A}"/>
+                <a16:creationId xmlns:a16="http://schemas.microsoft.com/office/drawing/2014/main" xmlns="" id="{77969D13-3FAD-5E4E-BA70-A1F965B26E6A}"/>
               </a:ext>
             </a:extLst>
           </p:cNvPr>
@@ -7120,7 +7120,7 @@
           <p:cNvPr id="2" name="Title 1">
             <a:extLst>
               <a:ext uri="{FF2B5EF4-FFF2-40B4-BE49-F238E27FC236}">
-                <a16:creationId xmlns:a16="http://schemas.microsoft.com/office/drawing/2014/main" id="{107F04A5-2F9A-AF48-823B-250BC8028176}"/>
+                <a16:creationId xmlns:a16="http://schemas.microsoft.com/office/drawing/2014/main" xmlns="" id="{107F04A5-2F9A-AF48-823B-250BC8028176}"/>
               </a:ext>
             </a:extLst>
           </p:cNvPr>
@@ -7139,11 +7139,11 @@
           <a:lstStyle/>
           <a:p>
             <a:r>
-              <a:rPr lang="en-US" altLang="zh-Hans" b="1" dirty="0"/>
+              <a:rPr lang="en-US" altLang="zh-CHS" b="1" dirty="0"/>
               <a:t>[Exercise]</a:t>
             </a:r>
             <a:r>
-              <a:rPr lang="zh-Hans" altLang="en-US" b="1" dirty="0"/>
+              <a:rPr lang="zh-CHS" altLang="en-US" b="1" dirty="0"/>
               <a:t> </a:t>
             </a:r>
             <a:r>
@@ -7151,7 +7151,7 @@
               <a:t>How to find the variance "by hand”</a:t>
             </a:r>
             <a:r>
-              <a:rPr lang="en-US" altLang="zh-Hans" b="1" dirty="0"/>
+              <a:rPr lang="en-US" altLang="zh-CHS" b="1" dirty="0"/>
               <a:t>?</a:t>
             </a:r>
             <a:endParaRPr lang="en-US" dirty="0"/>
@@ -7163,7 +7163,7 @@
           <p:cNvPr id="4" name="Slide Number Placeholder 3">
             <a:extLst>
               <a:ext uri="{FF2B5EF4-FFF2-40B4-BE49-F238E27FC236}">
-                <a16:creationId xmlns:a16="http://schemas.microsoft.com/office/drawing/2014/main" id="{77969D13-3FAD-5E4E-BA70-A1F965B26E6A}"/>
+                <a16:creationId xmlns:a16="http://schemas.microsoft.com/office/drawing/2014/main" xmlns="" id="{77969D13-3FAD-5E4E-BA70-A1F965B26E6A}"/>
               </a:ext>
             </a:extLst>
           </p:cNvPr>
@@ -7192,7 +7192,7 @@
           <p:cNvPr id="8" name="Picture 7">
             <a:extLst>
               <a:ext uri="{FF2B5EF4-FFF2-40B4-BE49-F238E27FC236}">
-                <a16:creationId xmlns:a16="http://schemas.microsoft.com/office/drawing/2014/main" id="{75CB0364-2E63-6841-9CAC-D105D19CE522}"/>
+                <a16:creationId xmlns:a16="http://schemas.microsoft.com/office/drawing/2014/main" xmlns="" id="{75CB0364-2E63-6841-9CAC-D105D19CE522}"/>
               </a:ext>
             </a:extLst>
           </p:cNvPr>
@@ -7257,7 +7257,7 @@
           <p:cNvPr id="2" name="Title 1">
             <a:extLst>
               <a:ext uri="{FF2B5EF4-FFF2-40B4-BE49-F238E27FC236}">
-                <a16:creationId xmlns:a16="http://schemas.microsoft.com/office/drawing/2014/main" id="{107F04A5-2F9A-AF48-823B-250BC8028176}"/>
+                <a16:creationId xmlns:a16="http://schemas.microsoft.com/office/drawing/2014/main" xmlns="" id="{107F04A5-2F9A-AF48-823B-250BC8028176}"/>
               </a:ext>
             </a:extLst>
           </p:cNvPr>
@@ -7276,11 +7276,11 @@
           <a:lstStyle/>
           <a:p>
             <a:r>
-              <a:rPr lang="en-US" altLang="zh-Hans" b="1" dirty="0"/>
+              <a:rPr lang="en-US" altLang="zh-CHS" b="1" dirty="0"/>
               <a:t>[Answer]</a:t>
             </a:r>
             <a:r>
-              <a:rPr lang="zh-Hans" altLang="en-US" b="1" dirty="0"/>
+              <a:rPr lang="zh-CHS" altLang="en-US" b="1" dirty="0"/>
               <a:t> </a:t>
             </a:r>
             <a:r>
@@ -7288,7 +7288,7 @@
               <a:t>How to find the variance "by hand”</a:t>
             </a:r>
             <a:r>
-              <a:rPr lang="en-US" altLang="zh-Hans" b="1" dirty="0"/>
+              <a:rPr lang="en-US" altLang="zh-CHS" b="1" dirty="0"/>
               <a:t>?</a:t>
             </a:r>
             <a:endParaRPr lang="en-US" dirty="0"/>
@@ -7300,7 +7300,7 @@
           <p:cNvPr id="4" name="Slide Number Placeholder 3">
             <a:extLst>
               <a:ext uri="{FF2B5EF4-FFF2-40B4-BE49-F238E27FC236}">
-                <a16:creationId xmlns:a16="http://schemas.microsoft.com/office/drawing/2014/main" id="{77969D13-3FAD-5E4E-BA70-A1F965B26E6A}"/>
+                <a16:creationId xmlns:a16="http://schemas.microsoft.com/office/drawing/2014/main" xmlns="" id="{77969D13-3FAD-5E4E-BA70-A1F965B26E6A}"/>
               </a:ext>
             </a:extLst>
           </p:cNvPr>
@@ -7329,7 +7329,7 @@
           <p:cNvPr id="8" name="Picture 7">
             <a:extLst>
               <a:ext uri="{FF2B5EF4-FFF2-40B4-BE49-F238E27FC236}">
-                <a16:creationId xmlns:a16="http://schemas.microsoft.com/office/drawing/2014/main" id="{75CB0364-2E63-6841-9CAC-D105D19CE522}"/>
+                <a16:creationId xmlns:a16="http://schemas.microsoft.com/office/drawing/2014/main" xmlns="" id="{75CB0364-2E63-6841-9CAC-D105D19CE522}"/>
               </a:ext>
             </a:extLst>
           </p:cNvPr>
@@ -7365,7 +7365,7 @@
           <p:cNvPr id="9" name="TextBox 8">
             <a:extLst>
               <a:ext uri="{FF2B5EF4-FFF2-40B4-BE49-F238E27FC236}">
-                <a16:creationId xmlns:a16="http://schemas.microsoft.com/office/drawing/2014/main" id="{1E43B2D0-2307-844D-B74A-BF307B04401B}"/>
+                <a16:creationId xmlns:a16="http://schemas.microsoft.com/office/drawing/2014/main" xmlns="" id="{1E43B2D0-2307-844D-B74A-BF307B04401B}"/>
               </a:ext>
             </a:extLst>
           </p:cNvPr>
@@ -7389,49 +7389,633 @@
           <a:lstStyle/>
           <a:p>
             <a:r>
-              <a:rPr lang="en-US" altLang="zh-Hans" dirty="0"/>
+              <a:rPr lang="en-US" altLang="zh-CHS" dirty="0"/>
               <a:t>Source:</a:t>
             </a:r>
             <a:r>
-              <a:rPr lang="zh-Hans" altLang="en-US" dirty="0"/>
+              <a:rPr lang="zh-CHS" altLang="en-US" dirty="0"/>
               <a:t> </a:t>
             </a:r>
             <a:r>
-              <a:rPr lang="en-US" altLang="zh-Hans" dirty="0"/>
+              <a:rPr lang="en-US" altLang="zh-CHS" dirty="0"/>
               <a:t>http://</a:t>
             </a:r>
             <a:r>
-              <a:rPr lang="en-US" altLang="zh-Hans" dirty="0" err="1"/>
+              <a:rPr lang="en-US" altLang="zh-CHS" dirty="0" err="1"/>
               <a:t>pirate.shu.edu</a:t>
             </a:r>
             <a:r>
-              <a:rPr lang="en-US" altLang="zh-Hans" dirty="0"/>
+              <a:rPr lang="en-US" altLang="zh-CHS" dirty="0"/>
               <a:t>/~</a:t>
             </a:r>
             <a:r>
-              <a:rPr lang="en-US" altLang="zh-Hans" dirty="0" err="1"/>
+              <a:rPr lang="en-US" altLang="zh-CHS" dirty="0" err="1"/>
               <a:t>wachsmut</a:t>
             </a:r>
             <a:r>
-              <a:rPr lang="en-US" altLang="zh-Hans" dirty="0"/>
+              <a:rPr lang="en-US" altLang="zh-CHS" dirty="0"/>
               <a:t>/Teaching/MATH1101/</a:t>
             </a:r>
             <a:r>
-              <a:rPr lang="en-US" altLang="zh-Hans" dirty="0" err="1"/>
+              <a:rPr lang="en-US" altLang="zh-CHS" dirty="0" err="1"/>
               <a:t>Descriptives</a:t>
             </a:r>
             <a:r>
-              <a:rPr lang="en-US" altLang="zh-Hans" dirty="0"/>
+              <a:rPr lang="en-US" altLang="zh-CHS" dirty="0"/>
               <a:t>/</a:t>
             </a:r>
             <a:r>
-              <a:rPr lang="en-US" altLang="zh-Hans" dirty="0" err="1"/>
+              <a:rPr lang="en-US" altLang="zh-CHS" dirty="0" err="1"/>
               <a:t>variability.html</a:t>
             </a:r>
             <a:endParaRPr lang="en-US" dirty="0"/>
           </a:p>
         </p:txBody>
       </p:sp>
+      <p:graphicFrame>
+        <p:nvGraphicFramePr>
+          <p:cNvPr id="5" name="Table 4"/>
+          <p:cNvGraphicFramePr>
+            <a:graphicFrameLocks noGrp="1"/>
+          </p:cNvGraphicFramePr>
+          <p:nvPr>
+            <p:extLst>
+              <p:ext uri="{D42A27DB-BD31-4B8C-83A1-F6EECF244321}">
+                <p14:modId xmlns:p14="http://schemas.microsoft.com/office/powerpoint/2010/main" val="632832526"/>
+              </p:ext>
+            </p:extLst>
+          </p:nvPr>
+        </p:nvGraphicFramePr>
+        <p:xfrm>
+          <a:off x="685800" y="1600200"/>
+          <a:ext cx="3200400" cy="3505200"/>
+        </p:xfrm>
+        <a:graphic>
+          <a:graphicData uri="http://schemas.openxmlformats.org/drawingml/2006/table">
+            <a:tbl>
+              <a:tblPr firstRow="1" bandRow="1">
+                <a:tableStyleId>{5C22544A-7EE6-4342-B048-85BDC9FD1C3A}</a:tableStyleId>
+              </a:tblPr>
+              <a:tblGrid>
+                <a:gridCol w="1066800"/>
+                <a:gridCol w="1066800"/>
+                <a:gridCol w="1066800"/>
+              </a:tblGrid>
+              <a:tr h="292100">
+                <a:tc>
+                  <a:txBody>
+                    <a:bodyPr/>
+                    <a:lstStyle/>
+                    <a:p>
+                      <a:endParaRPr lang="en-US" sz="1200" dirty="0"/>
+                    </a:p>
+                  </a:txBody>
+                  <a:tcPr/>
+                </a:tc>
+                <a:tc>
+                  <a:txBody>
+                    <a:bodyPr/>
+                    <a:lstStyle/>
+                    <a:p>
+                      <a:endParaRPr lang="en-US" sz="1200" dirty="0"/>
+                    </a:p>
+                  </a:txBody>
+                  <a:tcPr/>
+                </a:tc>
+                <a:tc>
+                  <a:txBody>
+                    <a:bodyPr/>
+                    <a:lstStyle/>
+                    <a:p>
+                      <a:endParaRPr lang="en-US" sz="1200" dirty="0"/>
+                    </a:p>
+                  </a:txBody>
+                  <a:tcPr/>
+                </a:tc>
+              </a:tr>
+              <a:tr h="292100">
+                <a:tc>
+                  <a:txBody>
+                    <a:bodyPr/>
+                    <a:lstStyle/>
+                    <a:p>
+                      <a:r>
+                        <a:rPr lang="en-US" altLang="zh-CN" sz="1200" dirty="0" smtClean="0"/>
+                        <a:t>6</a:t>
+                      </a:r>
+                      <a:endParaRPr lang="en-US" sz="1200" dirty="0"/>
+                    </a:p>
+                  </a:txBody>
+                  <a:tcPr/>
+                </a:tc>
+                <a:tc>
+                  <a:txBody>
+                    <a:bodyPr/>
+                    <a:lstStyle/>
+                    <a:p>
+                      <a:r>
+                        <a:rPr lang="en-US" altLang="zh-CN" sz="1200" dirty="0" smtClean="0"/>
+                        <a:t>4</a:t>
+                      </a:r>
+                      <a:endParaRPr lang="en-US" sz="1200" dirty="0"/>
+                    </a:p>
+                  </a:txBody>
+                  <a:tcPr/>
+                </a:tc>
+                <a:tc>
+                  <a:txBody>
+                    <a:bodyPr/>
+                    <a:lstStyle/>
+                    <a:p>
+                      <a:r>
+                        <a:rPr lang="en-US" altLang="zh-CN" sz="1200" dirty="0" smtClean="0"/>
+                        <a:t>16</a:t>
+                      </a:r>
+                      <a:endParaRPr lang="en-US" sz="1200" dirty="0"/>
+                    </a:p>
+                  </a:txBody>
+                  <a:tcPr/>
+                </a:tc>
+              </a:tr>
+              <a:tr h="292100">
+                <a:tc>
+                  <a:txBody>
+                    <a:bodyPr/>
+                    <a:lstStyle/>
+                    <a:p>
+                      <a:r>
+                        <a:rPr lang="en-US" altLang="zh-CN" sz="1200" dirty="0" smtClean="0"/>
+                        <a:t>8</a:t>
+                      </a:r>
+                      <a:endParaRPr lang="en-US" sz="1200" dirty="0"/>
+                    </a:p>
+                  </a:txBody>
+                  <a:tcPr/>
+                </a:tc>
+                <a:tc>
+                  <a:txBody>
+                    <a:bodyPr/>
+                    <a:lstStyle/>
+                    <a:p>
+                      <a:r>
+                        <a:rPr lang="en-US" altLang="zh-CN" sz="1200" dirty="0" smtClean="0"/>
+                        <a:t>-2</a:t>
+                      </a:r>
+                      <a:endParaRPr lang="en-US" sz="1200" dirty="0"/>
+                    </a:p>
+                  </a:txBody>
+                  <a:tcPr/>
+                </a:tc>
+                <a:tc>
+                  <a:txBody>
+                    <a:bodyPr/>
+                    <a:lstStyle/>
+                    <a:p>
+                      <a:r>
+                        <a:rPr lang="en-US" altLang="zh-CN" sz="1200" dirty="0" smtClean="0"/>
+                        <a:t>4</a:t>
+                      </a:r>
+                      <a:endParaRPr lang="en-US" sz="1200" dirty="0"/>
+                    </a:p>
+                  </a:txBody>
+                  <a:tcPr/>
+                </a:tc>
+              </a:tr>
+              <a:tr h="292100">
+                <a:tc>
+                  <a:txBody>
+                    <a:bodyPr/>
+                    <a:lstStyle/>
+                    <a:p>
+                      <a:r>
+                        <a:rPr lang="en-US" altLang="zh-CN" sz="1200" dirty="0" smtClean="0"/>
+                        <a:t>8</a:t>
+                      </a:r>
+                      <a:endParaRPr lang="en-US" sz="1200" dirty="0"/>
+                    </a:p>
+                  </a:txBody>
+                  <a:tcPr/>
+                </a:tc>
+                <a:tc>
+                  <a:txBody>
+                    <a:bodyPr/>
+                    <a:lstStyle/>
+                    <a:p>
+                      <a:r>
+                        <a:rPr lang="en-US" altLang="zh-CN" sz="1200" dirty="0" smtClean="0"/>
+                        <a:t>-2</a:t>
+                      </a:r>
+                      <a:endParaRPr lang="en-US" sz="1200" dirty="0"/>
+                    </a:p>
+                  </a:txBody>
+                  <a:tcPr/>
+                </a:tc>
+                <a:tc>
+                  <a:txBody>
+                    <a:bodyPr/>
+                    <a:lstStyle/>
+                    <a:p>
+                      <a:r>
+                        <a:rPr lang="en-US" altLang="zh-CN" sz="1200" dirty="0" smtClean="0"/>
+                        <a:t>4</a:t>
+                      </a:r>
+                      <a:endParaRPr lang="en-US" sz="1200" dirty="0"/>
+                    </a:p>
+                  </a:txBody>
+                  <a:tcPr/>
+                </a:tc>
+              </a:tr>
+              <a:tr h="292100">
+                <a:tc>
+                  <a:txBody>
+                    <a:bodyPr/>
+                    <a:lstStyle/>
+                    <a:p>
+                      <a:r>
+                        <a:rPr lang="en-US" altLang="zh-CN" sz="1200" dirty="0" smtClean="0"/>
+                        <a:t>10</a:t>
+                      </a:r>
+                      <a:endParaRPr lang="en-US" sz="1200" dirty="0"/>
+                    </a:p>
+                  </a:txBody>
+                  <a:tcPr/>
+                </a:tc>
+                <a:tc>
+                  <a:txBody>
+                    <a:bodyPr/>
+                    <a:lstStyle/>
+                    <a:p>
+                      <a:r>
+                        <a:rPr lang="en-US" altLang="zh-CN" sz="1200" dirty="0" smtClean="0"/>
+                        <a:t>0</a:t>
+                      </a:r>
+                      <a:endParaRPr lang="en-US" sz="1200" dirty="0"/>
+                    </a:p>
+                  </a:txBody>
+                  <a:tcPr/>
+                </a:tc>
+                <a:tc>
+                  <a:txBody>
+                    <a:bodyPr/>
+                    <a:lstStyle/>
+                    <a:p>
+                      <a:r>
+                        <a:rPr lang="en-US" altLang="zh-CN" sz="1200" dirty="0" smtClean="0"/>
+                        <a:t>0</a:t>
+                      </a:r>
+                      <a:endParaRPr lang="en-US" sz="1200" dirty="0"/>
+                    </a:p>
+                  </a:txBody>
+                  <a:tcPr/>
+                </a:tc>
+              </a:tr>
+              <a:tr h="292100">
+                <a:tc>
+                  <a:txBody>
+                    <a:bodyPr/>
+                    <a:lstStyle/>
+                    <a:p>
+                      <a:r>
+                        <a:rPr lang="en-US" altLang="zh-CN" sz="1200" dirty="0" smtClean="0"/>
+                        <a:t>10</a:t>
+                      </a:r>
+                      <a:endParaRPr lang="en-US" sz="1200" dirty="0"/>
+                    </a:p>
+                  </a:txBody>
+                  <a:tcPr/>
+                </a:tc>
+                <a:tc>
+                  <a:txBody>
+                    <a:bodyPr/>
+                    <a:lstStyle/>
+                    <a:p>
+                      <a:r>
+                        <a:rPr lang="en-US" altLang="zh-CN" sz="1200" dirty="0" smtClean="0"/>
+                        <a:t>0</a:t>
+                      </a:r>
+                      <a:endParaRPr lang="en-US" sz="1200" dirty="0"/>
+                    </a:p>
+                  </a:txBody>
+                  <a:tcPr/>
+                </a:tc>
+                <a:tc>
+                  <a:txBody>
+                    <a:bodyPr/>
+                    <a:lstStyle/>
+                    <a:p>
+                      <a:r>
+                        <a:rPr lang="en-US" altLang="zh-CN" sz="1200" dirty="0" smtClean="0"/>
+                        <a:t>0</a:t>
+                      </a:r>
+                      <a:endParaRPr lang="en-US" sz="1200" dirty="0"/>
+                    </a:p>
+                  </a:txBody>
+                  <a:tcPr/>
+                </a:tc>
+              </a:tr>
+              <a:tr h="292100">
+                <a:tc>
+                  <a:txBody>
+                    <a:bodyPr/>
+                    <a:lstStyle/>
+                    <a:p>
+                      <a:r>
+                        <a:rPr lang="en-US" altLang="zh-CN" sz="1200" dirty="0" smtClean="0"/>
+                        <a:t>10</a:t>
+                      </a:r>
+                      <a:endParaRPr lang="en-US" sz="1200" dirty="0"/>
+                    </a:p>
+                  </a:txBody>
+                  <a:tcPr/>
+                </a:tc>
+                <a:tc>
+                  <a:txBody>
+                    <a:bodyPr/>
+                    <a:lstStyle/>
+                    <a:p>
+                      <a:r>
+                        <a:rPr lang="en-US" altLang="zh-CN" sz="1200" dirty="0" smtClean="0"/>
+                        <a:t>0</a:t>
+                      </a:r>
+                      <a:endParaRPr lang="en-US" sz="1200" dirty="0"/>
+                    </a:p>
+                  </a:txBody>
+                  <a:tcPr/>
+                </a:tc>
+                <a:tc>
+                  <a:txBody>
+                    <a:bodyPr/>
+                    <a:lstStyle/>
+                    <a:p>
+                      <a:r>
+                        <a:rPr lang="en-US" altLang="zh-CN" sz="1200" dirty="0" smtClean="0"/>
+                        <a:t>0</a:t>
+                      </a:r>
+                      <a:endParaRPr lang="en-US" sz="1200" dirty="0"/>
+                    </a:p>
+                  </a:txBody>
+                  <a:tcPr/>
+                </a:tc>
+              </a:tr>
+              <a:tr h="292100">
+                <a:tc>
+                  <a:txBody>
+                    <a:bodyPr/>
+                    <a:lstStyle/>
+                    <a:p>
+                      <a:r>
+                        <a:rPr lang="en-US" altLang="zh-CN" sz="1200" dirty="0" smtClean="0"/>
+                        <a:t>10</a:t>
+                      </a:r>
+                      <a:endParaRPr lang="en-US" sz="1200" dirty="0"/>
+                    </a:p>
+                  </a:txBody>
+                  <a:tcPr/>
+                </a:tc>
+                <a:tc>
+                  <a:txBody>
+                    <a:bodyPr/>
+                    <a:lstStyle/>
+                    <a:p>
+                      <a:r>
+                        <a:rPr lang="en-US" altLang="zh-CN" sz="1200" dirty="0" smtClean="0"/>
+                        <a:t>0</a:t>
+                      </a:r>
+                      <a:endParaRPr lang="en-US" sz="1200" dirty="0"/>
+                    </a:p>
+                  </a:txBody>
+                  <a:tcPr/>
+                </a:tc>
+                <a:tc>
+                  <a:txBody>
+                    <a:bodyPr/>
+                    <a:lstStyle/>
+                    <a:p>
+                      <a:r>
+                        <a:rPr lang="en-US" altLang="zh-CN" sz="1200" dirty="0" smtClean="0"/>
+                        <a:t>0</a:t>
+                      </a:r>
+                      <a:endParaRPr lang="en-US" sz="1200" dirty="0"/>
+                    </a:p>
+                  </a:txBody>
+                  <a:tcPr/>
+                </a:tc>
+              </a:tr>
+              <a:tr h="292100">
+                <a:tc>
+                  <a:txBody>
+                    <a:bodyPr/>
+                    <a:lstStyle/>
+                    <a:p>
+                      <a:r>
+                        <a:rPr lang="en-US" altLang="zh-CN" sz="1200" dirty="0" smtClean="0"/>
+                        <a:t>10</a:t>
+                      </a:r>
+                      <a:endParaRPr lang="en-US" sz="1200" dirty="0"/>
+                    </a:p>
+                  </a:txBody>
+                  <a:tcPr/>
+                </a:tc>
+                <a:tc>
+                  <a:txBody>
+                    <a:bodyPr/>
+                    <a:lstStyle/>
+                    <a:p>
+                      <a:r>
+                        <a:rPr lang="en-US" altLang="zh-CN" sz="1200" dirty="0" smtClean="0"/>
+                        <a:t>0</a:t>
+                      </a:r>
+                      <a:endParaRPr lang="en-US" sz="1200" dirty="0"/>
+                    </a:p>
+                  </a:txBody>
+                  <a:tcPr/>
+                </a:tc>
+                <a:tc>
+                  <a:txBody>
+                    <a:bodyPr/>
+                    <a:lstStyle/>
+                    <a:p>
+                      <a:r>
+                        <a:rPr lang="en-US" altLang="zh-CN" sz="1200" dirty="0" smtClean="0"/>
+                        <a:t>0</a:t>
+                      </a:r>
+                      <a:endParaRPr lang="en-US" sz="1200" dirty="0"/>
+                    </a:p>
+                  </a:txBody>
+                  <a:tcPr/>
+                </a:tc>
+              </a:tr>
+              <a:tr h="292100">
+                <a:tc>
+                  <a:txBody>
+                    <a:bodyPr/>
+                    <a:lstStyle/>
+                    <a:p>
+                      <a:r>
+                        <a:rPr lang="en-US" altLang="zh-CN" sz="1200" dirty="0" smtClean="0"/>
+                        <a:t>12</a:t>
+                      </a:r>
+                      <a:endParaRPr lang="en-US" sz="1200" dirty="0"/>
+                    </a:p>
+                  </a:txBody>
+                  <a:tcPr/>
+                </a:tc>
+                <a:tc>
+                  <a:txBody>
+                    <a:bodyPr/>
+                    <a:lstStyle/>
+                    <a:p>
+                      <a:r>
+                        <a:rPr lang="en-US" altLang="zh-CN" sz="1200" dirty="0" smtClean="0"/>
+                        <a:t>2</a:t>
+                      </a:r>
+                      <a:endParaRPr lang="en-US" sz="1200" dirty="0"/>
+                    </a:p>
+                  </a:txBody>
+                  <a:tcPr/>
+                </a:tc>
+                <a:tc>
+                  <a:txBody>
+                    <a:bodyPr/>
+                    <a:lstStyle/>
+                    <a:p>
+                      <a:r>
+                        <a:rPr lang="en-US" altLang="zh-CN" sz="1200" dirty="0" smtClean="0"/>
+                        <a:t>4</a:t>
+                      </a:r>
+                      <a:endParaRPr lang="en-US" sz="1200" dirty="0"/>
+                    </a:p>
+                  </a:txBody>
+                  <a:tcPr/>
+                </a:tc>
+              </a:tr>
+              <a:tr h="292100">
+                <a:tc>
+                  <a:txBody>
+                    <a:bodyPr/>
+                    <a:lstStyle/>
+                    <a:p>
+                      <a:r>
+                        <a:rPr lang="en-US" altLang="zh-CN" sz="1200" dirty="0" smtClean="0"/>
+                        <a:t>12</a:t>
+                      </a:r>
+                      <a:endParaRPr lang="en-US" sz="1200" dirty="0"/>
+                    </a:p>
+                  </a:txBody>
+                  <a:tcPr/>
+                </a:tc>
+                <a:tc>
+                  <a:txBody>
+                    <a:bodyPr/>
+                    <a:lstStyle/>
+                    <a:p>
+                      <a:r>
+                        <a:rPr lang="en-US" altLang="zh-CN" sz="1200" dirty="0" smtClean="0"/>
+                        <a:t>2</a:t>
+                      </a:r>
+                      <a:endParaRPr lang="en-US" sz="1200" dirty="0"/>
+                    </a:p>
+                  </a:txBody>
+                  <a:tcPr/>
+                </a:tc>
+                <a:tc>
+                  <a:txBody>
+                    <a:bodyPr/>
+                    <a:lstStyle/>
+                    <a:p>
+                      <a:r>
+                        <a:rPr lang="en-US" altLang="zh-CN" sz="1200" dirty="0" smtClean="0"/>
+                        <a:t>4</a:t>
+                      </a:r>
+                      <a:endParaRPr lang="en-US" sz="1200" dirty="0"/>
+                    </a:p>
+                  </a:txBody>
+                  <a:tcPr/>
+                </a:tc>
+              </a:tr>
+              <a:tr h="292100">
+                <a:tc>
+                  <a:txBody>
+                    <a:bodyPr/>
+                    <a:lstStyle/>
+                    <a:p>
+                      <a:r>
+                        <a:rPr lang="en-US" altLang="zh-CN" sz="1200" dirty="0" smtClean="0"/>
+                        <a:t>14</a:t>
+                      </a:r>
+                      <a:endParaRPr lang="en-US" sz="1200" dirty="0"/>
+                    </a:p>
+                  </a:txBody>
+                  <a:tcPr/>
+                </a:tc>
+                <a:tc>
+                  <a:txBody>
+                    <a:bodyPr/>
+                    <a:lstStyle/>
+                    <a:p>
+                      <a:r>
+                        <a:rPr lang="en-US" altLang="zh-CN" sz="1200" dirty="0" smtClean="0"/>
+                        <a:t>4</a:t>
+                      </a:r>
+                      <a:endParaRPr lang="en-US" sz="1200" dirty="0"/>
+                    </a:p>
+                  </a:txBody>
+                  <a:tcPr/>
+                </a:tc>
+                <a:tc>
+                  <a:txBody>
+                    <a:bodyPr/>
+                    <a:lstStyle/>
+                    <a:p>
+                      <a:r>
+                        <a:rPr lang="en-US" altLang="zh-CN" sz="1200" dirty="0" smtClean="0"/>
+                        <a:t>16</a:t>
+                      </a:r>
+                      <a:endParaRPr lang="en-US" sz="1200" dirty="0"/>
+                    </a:p>
+                  </a:txBody>
+                  <a:tcPr/>
+                </a:tc>
+              </a:tr>
+            </a:tbl>
+          </a:graphicData>
+        </a:graphic>
+      </p:graphicFrame>
+      <p:pic>
+        <p:nvPicPr>
+          <p:cNvPr id="10" name="Picture 9">
+            <a:extLst>
+              <a:ext uri="{FF2B5EF4-FFF2-40B4-BE49-F238E27FC236}">
+                <a16:creationId xmlns:a16="http://schemas.microsoft.com/office/drawing/2014/main" xmlns="" id="{75CB0364-2E63-6841-9CAC-D105D19CE522}"/>
+              </a:ext>
+            </a:extLst>
+          </p:cNvPr>
+          <p:cNvPicPr>
+            <a:picLocks noChangeAspect="1"/>
+          </p:cNvPicPr>
+          <p:nvPr/>
+        </p:nvPicPr>
+        <p:blipFill rotWithShape="1">
+          <a:blip r:embed="rId2">
+            <a:extLst>
+              <a:ext uri="{28A0092B-C50C-407E-A947-70E740481C1C}">
+                <a14:useLocalDpi xmlns:a14="http://schemas.microsoft.com/office/drawing/2010/main" val="0"/>
+              </a:ext>
+            </a:extLst>
+          </a:blip>
+          <a:srcRect r="56526" b="87456"/>
+          <a:stretch/>
+        </p:blipFill>
+        <p:spPr>
+          <a:xfrm>
+            <a:off x="-76200" y="1371600"/>
+            <a:ext cx="4043079" cy="516149"/>
+          </a:xfrm>
+          <a:prstGeom prst="rect">
+            <a:avLst/>
+          </a:prstGeom>
+        </p:spPr>
+      </p:pic>
     </p:spTree>
     <p:extLst>
       <p:ext uri="{BB962C8B-B14F-4D97-AF65-F5344CB8AC3E}">
@@ -7467,7 +8051,7 @@
           <p:cNvPr id="2" name="Title 1">
             <a:extLst>
               <a:ext uri="{FF2B5EF4-FFF2-40B4-BE49-F238E27FC236}">
-                <a16:creationId xmlns:a16="http://schemas.microsoft.com/office/drawing/2014/main" id="{3F826242-333B-C847-98E9-923E828C5F24}"/>
+                <a16:creationId xmlns:a16="http://schemas.microsoft.com/office/drawing/2014/main" xmlns="" id="{3F826242-333B-C847-98E9-923E828C5F24}"/>
               </a:ext>
             </a:extLst>
           </p:cNvPr>
@@ -7486,47 +8070,47 @@
           <a:lstStyle/>
           <a:p>
             <a:r>
-              <a:rPr lang="en-US" altLang="zh-Hans" dirty="0"/>
+              <a:rPr lang="en-US" altLang="zh-CHS" dirty="0"/>
               <a:t>[Hands-on]</a:t>
             </a:r>
             <a:r>
-              <a:rPr lang="zh-Hans" altLang="en-US" dirty="0"/>
+              <a:rPr lang="zh-CHS" altLang="en-US" dirty="0"/>
               <a:t> </a:t>
             </a:r>
             <a:r>
-              <a:rPr lang="en-US" altLang="zh-Hans" dirty="0"/>
+              <a:rPr lang="en-US" altLang="zh-CHS" dirty="0"/>
               <a:t>using</a:t>
             </a:r>
             <a:r>
-              <a:rPr lang="zh-Hans" altLang="en-US" dirty="0"/>
+              <a:rPr lang="zh-CHS" altLang="en-US" dirty="0"/>
               <a:t> </a:t>
             </a:r>
             <a:r>
-              <a:rPr lang="en-US" altLang="zh-Hans" dirty="0"/>
+              <a:rPr lang="en-US" altLang="zh-CHS" dirty="0"/>
               <a:t>excel</a:t>
             </a:r>
             <a:r>
-              <a:rPr lang="zh-Hans" altLang="en-US" dirty="0"/>
+              <a:rPr lang="zh-CHS" altLang="en-US" dirty="0"/>
               <a:t> </a:t>
             </a:r>
             <a:r>
-              <a:rPr lang="en-US" altLang="zh-Hans" dirty="0"/>
+              <a:rPr lang="en-US" altLang="zh-CHS" dirty="0"/>
               <a:t>to</a:t>
             </a:r>
             <a:r>
-              <a:rPr lang="zh-Hans" altLang="en-US" dirty="0"/>
+              <a:rPr lang="zh-CHS" altLang="en-US" dirty="0"/>
               <a:t> </a:t>
             </a:r>
             <a:r>
-              <a:rPr lang="en-US" altLang="zh-Hans" dirty="0"/>
+              <a:rPr lang="en-US" altLang="zh-CHS" dirty="0"/>
               <a:t>calculate</a:t>
             </a:r>
             <a:r>
-              <a:rPr lang="zh-Hans" altLang="en-US" dirty="0"/>
+              <a:rPr lang="zh-CHS" altLang="en-US" dirty="0"/>
               <a:t> </a:t>
             </a:r>
             <a:r>
-              <a:rPr lang="en-US" altLang="zh-Hans" dirty="0"/>
+              <a:rPr lang="en-US" altLang="zh-CHS" dirty="0"/>
               <a:t>dispersions</a:t>
             </a:r>
             <a:endParaRPr lang="en-US" dirty="0"/>
@@ -7538,7 +8122,7 @@
           <p:cNvPr id="3" name="Content Placeholder 2">
             <a:extLst>
               <a:ext uri="{FF2B5EF4-FFF2-40B4-BE49-F238E27FC236}">
-                <a16:creationId xmlns:a16="http://schemas.microsoft.com/office/drawing/2014/main" id="{20DC0335-8E99-9549-9D8F-DB310D8E0473}"/>
+                <a16:creationId xmlns:a16="http://schemas.microsoft.com/office/drawing/2014/main" xmlns="" id="{20DC0335-8E99-9549-9D8F-DB310D8E0473}"/>
               </a:ext>
             </a:extLst>
           </p:cNvPr>
@@ -7581,7 +8165,7 @@
           <p:cNvPr id="4" name="Slide Number Placeholder 3">
             <a:extLst>
               <a:ext uri="{FF2B5EF4-FFF2-40B4-BE49-F238E27FC236}">
-                <a16:creationId xmlns:a16="http://schemas.microsoft.com/office/drawing/2014/main" id="{DE4280B3-5A14-414E-AA37-5AE72C84C170}"/>
+                <a16:creationId xmlns:a16="http://schemas.microsoft.com/office/drawing/2014/main" xmlns="" id="{DE4280B3-5A14-414E-AA37-5AE72C84C170}"/>
               </a:ext>
             </a:extLst>
           </p:cNvPr>
@@ -7640,7 +8224,7 @@
           <p:cNvPr id="2" name="Title 1">
             <a:extLst>
               <a:ext uri="{FF2B5EF4-FFF2-40B4-BE49-F238E27FC236}">
-                <a16:creationId xmlns:a16="http://schemas.microsoft.com/office/drawing/2014/main" id="{3F826242-333B-C847-98E9-923E828C5F24}"/>
+                <a16:creationId xmlns:a16="http://schemas.microsoft.com/office/drawing/2014/main" xmlns="" id="{3F826242-333B-C847-98E9-923E828C5F24}"/>
               </a:ext>
             </a:extLst>
           </p:cNvPr>
@@ -7659,47 +8243,47 @@
           <a:lstStyle/>
           <a:p>
             <a:r>
-              <a:rPr lang="en-US" altLang="zh-Hans" dirty="0"/>
+              <a:rPr lang="en-US" altLang="zh-CHS" dirty="0"/>
               <a:t>[Hands-on]</a:t>
             </a:r>
             <a:r>
-              <a:rPr lang="zh-Hans" altLang="en-US" dirty="0"/>
+              <a:rPr lang="zh-CHS" altLang="en-US" dirty="0"/>
               <a:t> </a:t>
             </a:r>
             <a:r>
-              <a:rPr lang="en-US" altLang="zh-Hans" dirty="0"/>
+              <a:rPr lang="en-US" altLang="zh-CHS" dirty="0"/>
               <a:t>using</a:t>
             </a:r>
             <a:r>
-              <a:rPr lang="zh-Hans" altLang="en-US" dirty="0"/>
+              <a:rPr lang="zh-CHS" altLang="en-US" dirty="0"/>
               <a:t> </a:t>
             </a:r>
             <a:r>
-              <a:rPr lang="en-US" altLang="zh-Hans" dirty="0"/>
+              <a:rPr lang="en-US" altLang="zh-CHS" dirty="0"/>
               <a:t>excel</a:t>
             </a:r>
             <a:r>
-              <a:rPr lang="zh-Hans" altLang="en-US" dirty="0"/>
+              <a:rPr lang="zh-CHS" altLang="en-US" dirty="0"/>
               <a:t> </a:t>
             </a:r>
             <a:r>
-              <a:rPr lang="en-US" altLang="zh-Hans" dirty="0"/>
+              <a:rPr lang="en-US" altLang="zh-CHS" dirty="0"/>
               <a:t>to</a:t>
             </a:r>
             <a:r>
-              <a:rPr lang="zh-Hans" altLang="en-US" dirty="0"/>
+              <a:rPr lang="zh-CHS" altLang="en-US" dirty="0"/>
               <a:t> </a:t>
             </a:r>
             <a:r>
-              <a:rPr lang="en-US" altLang="zh-Hans" dirty="0"/>
+              <a:rPr lang="en-US" altLang="zh-CHS" dirty="0"/>
               <a:t>calculate</a:t>
             </a:r>
             <a:r>
-              <a:rPr lang="zh-Hans" altLang="en-US" dirty="0"/>
+              <a:rPr lang="zh-CHS" altLang="en-US" dirty="0"/>
               <a:t> </a:t>
             </a:r>
             <a:r>
-              <a:rPr lang="en-US" altLang="zh-Hans" dirty="0"/>
+              <a:rPr lang="en-US" altLang="zh-CHS" dirty="0"/>
               <a:t>dispersions</a:t>
             </a:r>
             <a:endParaRPr lang="en-US" dirty="0"/>
@@ -7711,7 +8295,7 @@
           <p:cNvPr id="4" name="Slide Number Placeholder 3">
             <a:extLst>
               <a:ext uri="{FF2B5EF4-FFF2-40B4-BE49-F238E27FC236}">
-                <a16:creationId xmlns:a16="http://schemas.microsoft.com/office/drawing/2014/main" id="{DE4280B3-5A14-414E-AA37-5AE72C84C170}"/>
+                <a16:creationId xmlns:a16="http://schemas.microsoft.com/office/drawing/2014/main" xmlns="" id="{DE4280B3-5A14-414E-AA37-5AE72C84C170}"/>
               </a:ext>
             </a:extLst>
           </p:cNvPr>
@@ -7740,7 +8324,7 @@
           <p:cNvPr id="6" name="Rectangle 2">
             <a:extLst>
               <a:ext uri="{FF2B5EF4-FFF2-40B4-BE49-F238E27FC236}">
-                <a16:creationId xmlns:a16="http://schemas.microsoft.com/office/drawing/2014/main" id="{B6C50043-DA66-4648-B541-0D727167AEB9}"/>
+                <a16:creationId xmlns:a16="http://schemas.microsoft.com/office/drawing/2014/main" xmlns="" id="{B6C50043-DA66-4648-B541-0D727167AEB9}"/>
               </a:ext>
             </a:extLst>
           </p:cNvPr>
@@ -7767,7 +8351,7 @@
           </a:ln>
           <a:effectLst/>
           <a:extLst>
-            <a:ext uri="{91240B29-F687-4F45-9708-019B960494DF}">
+            <a:ext uri="{91240B29-F687-4f45-9708-019B960494DF}">
               <a14:hiddenLine xmlns:a14="http://schemas.microsoft.com/office/drawing/2010/main" w="9525">
                 <a:solidFill>
                   <a:schemeClr val="tx1"/>
@@ -7777,7 +8361,7 @@
                 <a:tailEnd/>
               </a14:hiddenLine>
             </a:ext>
-            <a:ext uri="{AF507438-7753-43E0-B8FC-AC1667EBCBE1}">
+            <a:ext uri="{AF507438-7753-43e0-B8FC-AC1667EBCBE1}">
               <a14:hiddenEffects xmlns:a14="http://schemas.microsoft.com/office/drawing/2010/main">
                 <a:effectLst>
                   <a:outerShdw dist="35921" dir="2700000" algn="ctr" rotWithShape="0">
@@ -8218,7 +8802,7 @@
           <p:cNvPr id="10" name="Picture 9">
             <a:extLst>
               <a:ext uri="{FF2B5EF4-FFF2-40B4-BE49-F238E27FC236}">
-                <a16:creationId xmlns:a16="http://schemas.microsoft.com/office/drawing/2014/main" id="{90DE603C-0C1F-9645-9AF9-27F1964BC27A}"/>
+                <a16:creationId xmlns:a16="http://schemas.microsoft.com/office/drawing/2014/main" xmlns="" id="{90DE603C-0C1F-9645-9AF9-27F1964BC27A}"/>
               </a:ext>
             </a:extLst>
           </p:cNvPr>
@@ -8284,7 +8868,7 @@
           <p:cNvPr id="2" name="Title 1">
             <a:extLst>
               <a:ext uri="{FF2B5EF4-FFF2-40B4-BE49-F238E27FC236}">
-                <a16:creationId xmlns:a16="http://schemas.microsoft.com/office/drawing/2014/main" id="{3F826242-333B-C847-98E9-923E828C5F24}"/>
+                <a16:creationId xmlns:a16="http://schemas.microsoft.com/office/drawing/2014/main" xmlns="" id="{3F826242-333B-C847-98E9-923E828C5F24}"/>
               </a:ext>
             </a:extLst>
           </p:cNvPr>
@@ -8303,47 +8887,47 @@
           <a:lstStyle/>
           <a:p>
             <a:r>
-              <a:rPr lang="en-US" altLang="zh-Hans" dirty="0"/>
+              <a:rPr lang="en-US" altLang="zh-CHS" dirty="0"/>
               <a:t>[Hands-on]</a:t>
             </a:r>
             <a:r>
-              <a:rPr lang="zh-Hans" altLang="en-US" dirty="0"/>
+              <a:rPr lang="zh-CHS" altLang="en-US" dirty="0"/>
               <a:t> </a:t>
             </a:r>
             <a:r>
-              <a:rPr lang="en-US" altLang="zh-Hans" dirty="0"/>
+              <a:rPr lang="en-US" altLang="zh-CHS" dirty="0"/>
               <a:t>using</a:t>
             </a:r>
             <a:r>
-              <a:rPr lang="zh-Hans" altLang="en-US" dirty="0"/>
+              <a:rPr lang="zh-CHS" altLang="en-US" dirty="0"/>
               <a:t> </a:t>
             </a:r>
             <a:r>
-              <a:rPr lang="en-US" altLang="zh-Hans" dirty="0"/>
+              <a:rPr lang="en-US" altLang="zh-CHS" dirty="0"/>
               <a:t>R</a:t>
             </a:r>
             <a:r>
-              <a:rPr lang="zh-Hans" altLang="en-US" dirty="0"/>
+              <a:rPr lang="zh-CHS" altLang="en-US" dirty="0"/>
               <a:t> </a:t>
             </a:r>
             <a:r>
-              <a:rPr lang="en-US" altLang="zh-Hans" dirty="0"/>
+              <a:rPr lang="en-US" altLang="zh-CHS" dirty="0"/>
               <a:t>to</a:t>
             </a:r>
             <a:r>
-              <a:rPr lang="zh-Hans" altLang="en-US" dirty="0"/>
+              <a:rPr lang="zh-CHS" altLang="en-US" dirty="0"/>
               <a:t> </a:t>
             </a:r>
             <a:r>
-              <a:rPr lang="en-US" altLang="zh-Hans" dirty="0"/>
+              <a:rPr lang="en-US" altLang="zh-CHS" dirty="0"/>
               <a:t>calculate</a:t>
             </a:r>
             <a:r>
-              <a:rPr lang="zh-Hans" altLang="en-US" dirty="0"/>
+              <a:rPr lang="zh-CHS" altLang="en-US" dirty="0"/>
               <a:t> </a:t>
             </a:r>
             <a:r>
-              <a:rPr lang="en-US" altLang="zh-Hans" dirty="0"/>
+              <a:rPr lang="en-US" altLang="zh-CHS" dirty="0"/>
               <a:t>dispersions</a:t>
             </a:r>
             <a:endParaRPr lang="en-US" dirty="0"/>
@@ -8355,7 +8939,7 @@
           <p:cNvPr id="3" name="Content Placeholder 2">
             <a:extLst>
               <a:ext uri="{FF2B5EF4-FFF2-40B4-BE49-F238E27FC236}">
-                <a16:creationId xmlns:a16="http://schemas.microsoft.com/office/drawing/2014/main" id="{20DC0335-8E99-9549-9D8F-DB310D8E0473}"/>
+                <a16:creationId xmlns:a16="http://schemas.microsoft.com/office/drawing/2014/main" xmlns="" id="{20DC0335-8E99-9549-9D8F-DB310D8E0473}"/>
               </a:ext>
             </a:extLst>
           </p:cNvPr>
@@ -8395,7 +8979,7 @@
           <p:cNvPr id="4" name="Slide Number Placeholder 3">
             <a:extLst>
               <a:ext uri="{FF2B5EF4-FFF2-40B4-BE49-F238E27FC236}">
-                <a16:creationId xmlns:a16="http://schemas.microsoft.com/office/drawing/2014/main" id="{DE4280B3-5A14-414E-AA37-5AE72C84C170}"/>
+                <a16:creationId xmlns:a16="http://schemas.microsoft.com/office/drawing/2014/main" xmlns="" id="{DE4280B3-5A14-414E-AA37-5AE72C84C170}"/>
               </a:ext>
             </a:extLst>
           </p:cNvPr>
@@ -8576,7 +9160,7 @@
           <p:cNvPr id="4" name="Slide Number Placeholder 3">
             <a:extLst>
               <a:ext uri="{FF2B5EF4-FFF2-40B4-BE49-F238E27FC236}">
-                <a16:creationId xmlns:a16="http://schemas.microsoft.com/office/drawing/2014/main" id="{9A8C9083-AB67-E945-98B3-2AD4AAAF7440}"/>
+                <a16:creationId xmlns:a16="http://schemas.microsoft.com/office/drawing/2014/main" xmlns="" id="{9A8C9083-AB67-E945-98B3-2AD4AAAF7440}"/>
               </a:ext>
             </a:extLst>
           </p:cNvPr>
@@ -8635,7 +9219,7 @@
           <p:cNvPr id="2" name="Title 1">
             <a:extLst>
               <a:ext uri="{FF2B5EF4-FFF2-40B4-BE49-F238E27FC236}">
-                <a16:creationId xmlns:a16="http://schemas.microsoft.com/office/drawing/2014/main" id="{3F826242-333B-C847-98E9-923E828C5F24}"/>
+                <a16:creationId xmlns:a16="http://schemas.microsoft.com/office/drawing/2014/main" xmlns="" id="{3F826242-333B-C847-98E9-923E828C5F24}"/>
               </a:ext>
             </a:extLst>
           </p:cNvPr>
@@ -8654,47 +9238,47 @@
           <a:lstStyle/>
           <a:p>
             <a:r>
-              <a:rPr lang="en-US" altLang="zh-Hans" dirty="0"/>
+              <a:rPr lang="en-US" altLang="zh-CHS" dirty="0"/>
               <a:t>[Hands-on]</a:t>
             </a:r>
             <a:r>
-              <a:rPr lang="zh-Hans" altLang="en-US" dirty="0"/>
+              <a:rPr lang="zh-CHS" altLang="en-US" dirty="0"/>
               <a:t> </a:t>
             </a:r>
             <a:r>
-              <a:rPr lang="en-US" altLang="zh-Hans" dirty="0"/>
+              <a:rPr lang="en-US" altLang="zh-CHS" dirty="0"/>
               <a:t>using</a:t>
             </a:r>
             <a:r>
-              <a:rPr lang="zh-Hans" altLang="en-US" dirty="0"/>
+              <a:rPr lang="zh-CHS" altLang="en-US" dirty="0"/>
               <a:t> </a:t>
             </a:r>
             <a:r>
-              <a:rPr lang="en-US" altLang="zh-Hans" dirty="0"/>
+              <a:rPr lang="en-US" altLang="zh-CHS" dirty="0"/>
               <a:t>R</a:t>
             </a:r>
             <a:r>
-              <a:rPr lang="zh-Hans" altLang="en-US" dirty="0"/>
+              <a:rPr lang="zh-CHS" altLang="en-US" dirty="0"/>
               <a:t> </a:t>
             </a:r>
             <a:r>
-              <a:rPr lang="en-US" altLang="zh-Hans" dirty="0"/>
+              <a:rPr lang="en-US" altLang="zh-CHS" dirty="0"/>
               <a:t>to</a:t>
             </a:r>
             <a:r>
-              <a:rPr lang="zh-Hans" altLang="en-US" dirty="0"/>
+              <a:rPr lang="zh-CHS" altLang="en-US" dirty="0"/>
               <a:t> </a:t>
             </a:r>
             <a:r>
-              <a:rPr lang="en-US" altLang="zh-Hans" dirty="0"/>
+              <a:rPr lang="en-US" altLang="zh-CHS" dirty="0"/>
               <a:t>calculate</a:t>
             </a:r>
             <a:r>
-              <a:rPr lang="zh-Hans" altLang="en-US" dirty="0"/>
+              <a:rPr lang="zh-CHS" altLang="en-US" dirty="0"/>
               <a:t> </a:t>
             </a:r>
             <a:r>
-              <a:rPr lang="en-US" altLang="zh-Hans" dirty="0"/>
+              <a:rPr lang="en-US" altLang="zh-CHS" dirty="0"/>
               <a:t>dispersions</a:t>
             </a:r>
             <a:endParaRPr lang="en-US" dirty="0"/>
@@ -8706,7 +9290,7 @@
           <p:cNvPr id="3" name="Content Placeholder 2">
             <a:extLst>
               <a:ext uri="{FF2B5EF4-FFF2-40B4-BE49-F238E27FC236}">
-                <a16:creationId xmlns:a16="http://schemas.microsoft.com/office/drawing/2014/main" id="{20DC0335-8E99-9549-9D8F-DB310D8E0473}"/>
+                <a16:creationId xmlns:a16="http://schemas.microsoft.com/office/drawing/2014/main" xmlns="" id="{20DC0335-8E99-9549-9D8F-DB310D8E0473}"/>
               </a:ext>
             </a:extLst>
           </p:cNvPr>
@@ -8737,7 +9321,7 @@
           <p:cNvPr id="4" name="Slide Number Placeholder 3">
             <a:extLst>
               <a:ext uri="{FF2B5EF4-FFF2-40B4-BE49-F238E27FC236}">
-                <a16:creationId xmlns:a16="http://schemas.microsoft.com/office/drawing/2014/main" id="{DE4280B3-5A14-414E-AA37-5AE72C84C170}"/>
+                <a16:creationId xmlns:a16="http://schemas.microsoft.com/office/drawing/2014/main" xmlns="" id="{DE4280B3-5A14-414E-AA37-5AE72C84C170}"/>
               </a:ext>
             </a:extLst>
           </p:cNvPr>
@@ -8766,7 +9350,7 @@
           <p:cNvPr id="6" name="Picture 5">
             <a:extLst>
               <a:ext uri="{FF2B5EF4-FFF2-40B4-BE49-F238E27FC236}">
-                <a16:creationId xmlns:a16="http://schemas.microsoft.com/office/drawing/2014/main" id="{245F6F4E-6F29-9E45-BAB9-23B0C4A8CFAC}"/>
+                <a16:creationId xmlns:a16="http://schemas.microsoft.com/office/drawing/2014/main" xmlns="" id="{245F6F4E-6F29-9E45-BAB9-23B0C4A8CFAC}"/>
               </a:ext>
             </a:extLst>
           </p:cNvPr>
@@ -8832,7 +9416,7 @@
           <p:cNvPr id="2" name="Title 1">
             <a:extLst>
               <a:ext uri="{FF2B5EF4-FFF2-40B4-BE49-F238E27FC236}">
-                <a16:creationId xmlns:a16="http://schemas.microsoft.com/office/drawing/2014/main" id="{EA0AB704-F3AE-6048-84D9-EDC737AA3035}"/>
+                <a16:creationId xmlns:a16="http://schemas.microsoft.com/office/drawing/2014/main" xmlns="" id="{EA0AB704-F3AE-6048-84D9-EDC737AA3035}"/>
               </a:ext>
             </a:extLst>
           </p:cNvPr>
@@ -8849,23 +9433,23 @@
           <a:lstStyle/>
           <a:p>
             <a:r>
-              <a:rPr lang="en-US" altLang="zh-Hans" dirty="0"/>
+              <a:rPr lang="en-US" altLang="zh-CHS" dirty="0"/>
               <a:t>Summary</a:t>
             </a:r>
             <a:r>
-              <a:rPr lang="zh-Hans" altLang="en-US" dirty="0"/>
+              <a:rPr lang="zh-CHS" altLang="en-US" dirty="0"/>
               <a:t> </a:t>
             </a:r>
             <a:r>
-              <a:rPr lang="en-US" altLang="zh-Hans" dirty="0"/>
+              <a:rPr lang="en-US" altLang="zh-CHS" dirty="0"/>
               <a:t>of</a:t>
             </a:r>
             <a:r>
-              <a:rPr lang="zh-Hans" altLang="en-US" dirty="0"/>
+              <a:rPr lang="zh-CHS" altLang="en-US" dirty="0"/>
               <a:t> </a:t>
             </a:r>
             <a:r>
-              <a:rPr lang="en-US" altLang="zh-Hans" dirty="0"/>
+              <a:rPr lang="en-US" altLang="zh-CHS" dirty="0"/>
               <a:t>Concepts</a:t>
             </a:r>
             <a:endParaRPr lang="en-US" dirty="0"/>
@@ -8877,7 +9461,7 @@
           <p:cNvPr id="3" name="Content Placeholder 2">
             <a:extLst>
               <a:ext uri="{FF2B5EF4-FFF2-40B4-BE49-F238E27FC236}">
-                <a16:creationId xmlns:a16="http://schemas.microsoft.com/office/drawing/2014/main" id="{4807506A-F287-4C41-B685-A521F3A88582}"/>
+                <a16:creationId xmlns:a16="http://schemas.microsoft.com/office/drawing/2014/main" xmlns="" id="{4807506A-F287-4C41-B685-A521F3A88582}"/>
               </a:ext>
             </a:extLst>
           </p:cNvPr>
@@ -8894,39 +9478,39 @@
           <a:lstStyle/>
           <a:p>
             <a:r>
-              <a:rPr lang="en-US" altLang="zh-Hans" dirty="0"/>
+              <a:rPr lang="en-US" altLang="zh-CHS" dirty="0"/>
               <a:t>Range</a:t>
             </a:r>
           </a:p>
           <a:p>
             <a:r>
-              <a:rPr lang="en-US" altLang="zh-Hans" dirty="0"/>
+              <a:rPr lang="en-US" altLang="zh-CHS" dirty="0"/>
               <a:t>Deviation</a:t>
             </a:r>
           </a:p>
           <a:p>
             <a:r>
-              <a:rPr lang="en-US" altLang="zh-Hans" dirty="0"/>
+              <a:rPr lang="en-US" altLang="zh-CHS" dirty="0"/>
               <a:t>Spread</a:t>
             </a:r>
           </a:p>
           <a:p>
             <a:r>
-              <a:rPr lang="en-US" altLang="zh-Hans" dirty="0"/>
+              <a:rPr lang="en-US" altLang="zh-CHS" dirty="0"/>
               <a:t>Variance</a:t>
             </a:r>
           </a:p>
           <a:p>
             <a:r>
-              <a:rPr lang="en-US" altLang="zh-Hans" dirty="0"/>
+              <a:rPr lang="en-US" altLang="zh-CHS" dirty="0"/>
               <a:t>Standard</a:t>
             </a:r>
             <a:r>
-              <a:rPr lang="zh-Hans" altLang="en-US" dirty="0"/>
+              <a:rPr lang="zh-CHS" altLang="en-US" dirty="0"/>
               <a:t> </a:t>
             </a:r>
             <a:r>
-              <a:rPr lang="en-US" altLang="zh-Hans" dirty="0"/>
+              <a:rPr lang="en-US" altLang="zh-CHS" dirty="0"/>
               <a:t>deviation</a:t>
             </a:r>
           </a:p>
@@ -8940,7 +9524,7 @@
           <p:cNvPr id="4" name="Slide Number Placeholder 3">
             <a:extLst>
               <a:ext uri="{FF2B5EF4-FFF2-40B4-BE49-F238E27FC236}">
-                <a16:creationId xmlns:a16="http://schemas.microsoft.com/office/drawing/2014/main" id="{530D4248-21B9-CE4A-A69F-9006E1FDF596}"/>
+                <a16:creationId xmlns:a16="http://schemas.microsoft.com/office/drawing/2014/main" xmlns="" id="{530D4248-21B9-CE4A-A69F-9006E1FDF596}"/>
               </a:ext>
             </a:extLst>
           </p:cNvPr>
@@ -9137,7 +9721,7 @@
           <p:cNvPr id="5" name="Slide Number Placeholder 4">
             <a:extLst>
               <a:ext uri="{FF2B5EF4-FFF2-40B4-BE49-F238E27FC236}">
-                <a16:creationId xmlns:a16="http://schemas.microsoft.com/office/drawing/2014/main" id="{0210A96D-1274-234A-B073-1396C281B049}"/>
+                <a16:creationId xmlns:a16="http://schemas.microsoft.com/office/drawing/2014/main" xmlns="" id="{0210A96D-1274-234A-B073-1396C281B049}"/>
               </a:ext>
             </a:extLst>
           </p:cNvPr>
@@ -9239,7 +9823,7 @@
           <p:cNvPr id="5" name="Picture 4">
             <a:extLst>
               <a:ext uri="{FF2B5EF4-FFF2-40B4-BE49-F238E27FC236}">
-                <a16:creationId xmlns:a16="http://schemas.microsoft.com/office/drawing/2014/main" id="{0FF1634B-DB30-DE42-A096-D52FFD56A54D}"/>
+                <a16:creationId xmlns:a16="http://schemas.microsoft.com/office/drawing/2014/main" xmlns="" id="{0FF1634B-DB30-DE42-A096-D52FFD56A54D}"/>
               </a:ext>
             </a:extLst>
           </p:cNvPr>
@@ -9275,7 +9859,7 @@
           <p:cNvPr id="6" name="Slide Number Placeholder 5">
             <a:extLst>
               <a:ext uri="{FF2B5EF4-FFF2-40B4-BE49-F238E27FC236}">
-                <a16:creationId xmlns:a16="http://schemas.microsoft.com/office/drawing/2014/main" id="{41F7F595-8483-A64E-A3A6-D095A8141755}"/>
+                <a16:creationId xmlns:a16="http://schemas.microsoft.com/office/drawing/2014/main" xmlns="" id="{41F7F595-8483-A64E-A3A6-D095A8141755}"/>
               </a:ext>
             </a:extLst>
           </p:cNvPr>
@@ -9506,7 +10090,7 @@
           <p:cNvPr id="3" name="Slide Number Placeholder 2">
             <a:extLst>
               <a:ext uri="{FF2B5EF4-FFF2-40B4-BE49-F238E27FC236}">
-                <a16:creationId xmlns:a16="http://schemas.microsoft.com/office/drawing/2014/main" id="{5F938A26-AE78-4E49-93C5-58D587302271}"/>
+                <a16:creationId xmlns:a16="http://schemas.microsoft.com/office/drawing/2014/main" xmlns="" id="{5F938A26-AE78-4E49-93C5-58D587302271}"/>
               </a:ext>
             </a:extLst>
           </p:cNvPr>
@@ -9724,7 +10308,7 @@
           <p:cNvPr id="4" name="Slide Number Placeholder 3">
             <a:extLst>
               <a:ext uri="{FF2B5EF4-FFF2-40B4-BE49-F238E27FC236}">
-                <a16:creationId xmlns:a16="http://schemas.microsoft.com/office/drawing/2014/main" id="{8E7423CD-67CD-E94E-B53E-33E817AB1610}"/>
+                <a16:creationId xmlns:a16="http://schemas.microsoft.com/office/drawing/2014/main" xmlns="" id="{8E7423CD-67CD-E94E-B53E-33E817AB1610}"/>
               </a:ext>
             </a:extLst>
           </p:cNvPr>
@@ -9761,7 +10345,7 @@
   <p:timing>
     <p:tnLst>
       <p:par>
-        <p:cTn id="1" dur="indefinite" restart="never" nodeType="tmRoot">
+        <p:cTn xmlns:p14="http://schemas.microsoft.com/office/powerpoint/2010/main" id="1" dur="indefinite" restart="never" nodeType="tmRoot">
           <p:childTnLst>
             <p:seq concurrent="1" nextAc="seek">
               <p:cTn id="2" dur="indefinite" nodeType="mainSeq">
@@ -10013,7 +10597,7 @@
           <p:cNvPr id="4" name="Slide Number Placeholder 3">
             <a:extLst>
               <a:ext uri="{FF2B5EF4-FFF2-40B4-BE49-F238E27FC236}">
-                <a16:creationId xmlns:a16="http://schemas.microsoft.com/office/drawing/2014/main" id="{56039675-6349-1443-A259-44220C6AF843}"/>
+                <a16:creationId xmlns:a16="http://schemas.microsoft.com/office/drawing/2014/main" xmlns="" id="{56039675-6349-1443-A259-44220C6AF843}"/>
               </a:ext>
             </a:extLst>
           </p:cNvPr>
@@ -10050,7 +10634,7 @@
   <p:timing>
     <p:tnLst>
       <p:par>
-        <p:cTn id="1" dur="indefinite" restart="never" nodeType="tmRoot">
+        <p:cTn xmlns:p14="http://schemas.microsoft.com/office/powerpoint/2010/main" id="1" dur="indefinite" restart="never" nodeType="tmRoot">
           <p:childTnLst>
             <p:seq concurrent="1" nextAc="seek">
               <p:cTn id="2" dur="indefinite" nodeType="mainSeq">
@@ -10163,7 +10747,7 @@
           <a:lstStyle/>
           <a:p>
             <a:r>
-              <a:rPr lang="en-US" altLang="zh-Hans" b="1" dirty="0">
+              <a:rPr lang="en-US" altLang="zh-CHS" b="1" dirty="0">
                 <a:solidFill>
                   <a:srgbClr val="000099"/>
                 </a:solidFill>
@@ -10230,7 +10814,7 @@
           <p:cNvPr id="4" name="Slide Number Placeholder 3">
             <a:extLst>
               <a:ext uri="{FF2B5EF4-FFF2-40B4-BE49-F238E27FC236}">
-                <a16:creationId xmlns:a16="http://schemas.microsoft.com/office/drawing/2014/main" id="{56039675-6349-1443-A259-44220C6AF843}"/>
+                <a16:creationId xmlns:a16="http://schemas.microsoft.com/office/drawing/2014/main" xmlns="" id="{56039675-6349-1443-A259-44220C6AF843}"/>
               </a:ext>
             </a:extLst>
           </p:cNvPr>
@@ -10259,7 +10843,7 @@
           <p:cNvPr id="9" name="Picture 8">
             <a:extLst>
               <a:ext uri="{FF2B5EF4-FFF2-40B4-BE49-F238E27FC236}">
-                <a16:creationId xmlns:a16="http://schemas.microsoft.com/office/drawing/2014/main" id="{46F20157-197D-7840-86C5-A5BB78E5A2A4}"/>
+                <a16:creationId xmlns:a16="http://schemas.microsoft.com/office/drawing/2014/main" xmlns="" id="{46F20157-197D-7840-86C5-A5BB78E5A2A4}"/>
               </a:ext>
             </a:extLst>
           </p:cNvPr>
@@ -10429,7 +11013,7 @@
           <p:cNvPr id="2" name="Slide Number Placeholder 1">
             <a:extLst>
               <a:ext uri="{FF2B5EF4-FFF2-40B4-BE49-F238E27FC236}">
-                <a16:creationId xmlns:a16="http://schemas.microsoft.com/office/drawing/2014/main" id="{E10AAF15-5C40-E446-9F4D-B6BD11744571}"/>
+                <a16:creationId xmlns:a16="http://schemas.microsoft.com/office/drawing/2014/main" xmlns="" id="{E10AAF15-5C40-E446-9F4D-B6BD11744571}"/>
               </a:ext>
             </a:extLst>
           </p:cNvPr>

</xml_diff>

<commit_message>
add spss data examples
</commit_message>
<xml_diff>
--- a/Lecture 3- Measure of Dispersion/Lecture 3- Measure of Dispersion.pptx
+++ b/Lecture 3- Measure of Dispersion/Lecture 3- Measure of Dispersion.pptx
@@ -5,10 +5,10 @@
     <p:sldMasterId id="2147483648" r:id="rId1"/>
   </p:sldMasterIdLst>
   <p:notesMasterIdLst>
-    <p:notesMasterId r:id="rId23"/>
+    <p:notesMasterId r:id="rId27"/>
   </p:notesMasterIdLst>
   <p:handoutMasterIdLst>
-    <p:handoutMasterId r:id="rId24"/>
+    <p:handoutMasterId r:id="rId28"/>
   </p:handoutMasterIdLst>
   <p:sldIdLst>
     <p:sldId id="256" r:id="rId2"/>
@@ -31,7 +31,11 @@
     <p:sldId id="308" r:id="rId19"/>
     <p:sldId id="309" r:id="rId20"/>
     <p:sldId id="310" r:id="rId21"/>
-    <p:sldId id="304" r:id="rId22"/>
+    <p:sldId id="312" r:id="rId22"/>
+    <p:sldId id="313" r:id="rId23"/>
+    <p:sldId id="314" r:id="rId24"/>
+    <p:sldId id="315" r:id="rId25"/>
+    <p:sldId id="304" r:id="rId26"/>
   </p:sldIdLst>
   <p:sldSz cx="9144000" cy="6858000" type="screen4x3"/>
   <p:notesSz cx="7315200" cy="9601200"/>
@@ -4818,7 +4822,7 @@
           <a:graphicData uri="http://schemas.openxmlformats.org/presentationml/2006/ole">
             <mc:AlternateContent xmlns:mc="http://schemas.openxmlformats.org/markup-compatibility/2006">
               <mc:Choice xmlns:v="urn:schemas-microsoft-com:vml" Requires="v">
-                <p:oleObj spid="_x0000_s14663" name="Equation" r:id="rId4" imgW="596880" imgH="279360" progId="Equation.DSMT4">
+                <p:oleObj spid="_x0000_s14695" name="Equation" r:id="rId4" imgW="596880" imgH="279360" progId="Equation.DSMT4">
                   <p:embed/>
                 </p:oleObj>
               </mc:Choice>
@@ -4894,7 +4898,7 @@
           <a:graphicData uri="http://schemas.openxmlformats.org/presentationml/2006/ole">
             <mc:AlternateContent xmlns:mc="http://schemas.openxmlformats.org/markup-compatibility/2006">
               <mc:Choice xmlns:v="urn:schemas-microsoft-com:vml" Requires="v">
-                <p:oleObj spid="_x0000_s14664" name="Equation" r:id="rId6" imgW="799920" imgH="609480" progId="Equation.DSMT4">
+                <p:oleObj spid="_x0000_s14696" name="Equation" r:id="rId6" imgW="799920" imgH="609480" progId="Equation.DSMT4">
                   <p:embed/>
                 </p:oleObj>
               </mc:Choice>
@@ -5495,7 +5499,7 @@
           <a:graphicData uri="http://schemas.openxmlformats.org/presentationml/2006/ole">
             <mc:AlternateContent xmlns:mc="http://schemas.openxmlformats.org/markup-compatibility/2006">
               <mc:Choice xmlns:v="urn:schemas-microsoft-com:vml" Requires="v">
-                <p:oleObj spid="_x0000_s17709" name="Equation" r:id="rId4" imgW="736560" imgH="609480" progId="Equation.DSMT4">
+                <p:oleObj spid="_x0000_s17741" name="Equation" r:id="rId4" imgW="736560" imgH="609480" progId="Equation.DSMT4">
                   <p:embed/>
                 </p:oleObj>
               </mc:Choice>
@@ -5557,7 +5561,7 @@
           <a:graphicData uri="http://schemas.openxmlformats.org/presentationml/2006/ole">
             <mc:AlternateContent xmlns:mc="http://schemas.openxmlformats.org/markup-compatibility/2006">
               <mc:Choice xmlns:v="urn:schemas-microsoft-com:vml" Requires="v">
-                <p:oleObj spid="_x0000_s17710" name="Equation" r:id="rId6" imgW="1155600" imgH="431640" progId="Equation.DSMT4">
+                <p:oleObj spid="_x0000_s17742" name="Equation" r:id="rId6" imgW="1155600" imgH="431640" progId="Equation.DSMT4">
                   <p:embed/>
                 </p:oleObj>
               </mc:Choice>
@@ -6095,7 +6099,7 @@
           <a:graphicData uri="http://schemas.openxmlformats.org/presentationml/2006/ole">
             <mc:AlternateContent xmlns:mc="http://schemas.openxmlformats.org/markup-compatibility/2006">
               <mc:Choice xmlns:v="urn:schemas-microsoft-com:vml" Requires="v">
-                <p:oleObj spid="_x0000_s15688" name="Equation" r:id="rId4" imgW="3517560" imgH="609480" progId="Equation.DSMT4">
+                <p:oleObj spid="_x0000_s15720" name="Equation" r:id="rId4" imgW="3517560" imgH="609480" progId="Equation.DSMT4">
                   <p:embed/>
                 </p:oleObj>
               </mc:Choice>
@@ -6178,7 +6182,7 @@
           <a:graphicData uri="http://schemas.openxmlformats.org/presentationml/2006/ole">
             <mc:AlternateContent xmlns:mc="http://schemas.openxmlformats.org/markup-compatibility/2006">
               <mc:Choice xmlns:v="urn:schemas-microsoft-com:vml" Requires="v">
-                <p:oleObj spid="_x0000_s15689" name="Equation" r:id="rId6" imgW="1638000" imgH="660240" progId="Equation.DSMT4">
+                <p:oleObj spid="_x0000_s15721" name="Equation" r:id="rId6" imgW="1638000" imgH="660240" progId="Equation.DSMT4">
                   <p:embed/>
                 </p:oleObj>
               </mc:Choice>
@@ -6503,7 +6507,7 @@
           <a:graphicData uri="http://schemas.openxmlformats.org/presentationml/2006/ole">
             <mc:AlternateContent xmlns:mc="http://schemas.openxmlformats.org/markup-compatibility/2006">
               <mc:Choice xmlns:v="urn:schemas-microsoft-com:vml" Requires="v">
-                <p:oleObj spid="_x0000_s16712" name="Equation" r:id="rId4" imgW="3568680" imgH="609480" progId="Equation.DSMT4">
+                <p:oleObj spid="_x0000_s16744" name="Equation" r:id="rId4" imgW="3568680" imgH="609480" progId="Equation.DSMT4">
                   <p:embed/>
                 </p:oleObj>
               </mc:Choice>
@@ -6586,7 +6590,7 @@
           <a:graphicData uri="http://schemas.openxmlformats.org/presentationml/2006/ole">
             <mc:AlternateContent xmlns:mc="http://schemas.openxmlformats.org/markup-compatibility/2006">
               <mc:Choice xmlns:v="urn:schemas-microsoft-com:vml" Requires="v">
-                <p:oleObj spid="_x0000_s16713" name="Equation" r:id="rId6" imgW="1600200" imgH="660240" progId="Equation.DSMT4">
+                <p:oleObj spid="_x0000_s16745" name="Equation" r:id="rId6" imgW="1600200" imgH="660240" progId="Equation.DSMT4">
                   <p:embed/>
                 </p:oleObj>
               </mc:Choice>
@@ -9416,6 +9420,876 @@
           <p:cNvPr id="2" name="Title 1">
             <a:extLst>
               <a:ext uri="{FF2B5EF4-FFF2-40B4-BE49-F238E27FC236}">
+                <a16:creationId xmlns:a16="http://schemas.microsoft.com/office/drawing/2014/main" xmlns="" id="{3F826242-333B-C847-98E9-923E828C5F24}"/>
+              </a:ext>
+            </a:extLst>
+          </p:cNvPr>
+          <p:cNvSpPr>
+            <a:spLocks noGrp="1"/>
+          </p:cNvSpPr>
+          <p:nvPr>
+            <p:ph type="title"/>
+          </p:nvPr>
+        </p:nvSpPr>
+        <p:spPr/>
+        <p:txBody>
+          <a:bodyPr>
+            <a:normAutofit fontScale="90000"/>
+          </a:bodyPr>
+          <a:lstStyle/>
+          <a:p>
+            <a:r>
+              <a:rPr lang="en-US" altLang="zh-CHS" dirty="0"/>
+              <a:t>[Hands-on]</a:t>
+            </a:r>
+            <a:r>
+              <a:rPr lang="zh-CHS" altLang="en-US" dirty="0"/>
+              <a:t> </a:t>
+            </a:r>
+            <a:r>
+              <a:rPr lang="en-US" altLang="zh-CHS" dirty="0"/>
+              <a:t>using</a:t>
+            </a:r>
+            <a:r>
+              <a:rPr lang="zh-CHS" altLang="en-US" dirty="0"/>
+              <a:t> </a:t>
+            </a:r>
+            <a:r>
+              <a:rPr lang="en-US" altLang="zh-CHS" dirty="0" smtClean="0"/>
+              <a:t>SPSS</a:t>
+            </a:r>
+            <a:r>
+              <a:rPr lang="zh-CHS" altLang="en-US" dirty="0" smtClean="0"/>
+              <a:t> </a:t>
+            </a:r>
+            <a:r>
+              <a:rPr lang="en-US" altLang="zh-CHS" dirty="0"/>
+              <a:t>to</a:t>
+            </a:r>
+            <a:r>
+              <a:rPr lang="zh-CHS" altLang="en-US" dirty="0"/>
+              <a:t> </a:t>
+            </a:r>
+            <a:r>
+              <a:rPr lang="en-US" altLang="zh-CHS" dirty="0"/>
+              <a:t>calculate</a:t>
+            </a:r>
+            <a:r>
+              <a:rPr lang="zh-CHS" altLang="en-US" dirty="0"/>
+              <a:t> </a:t>
+            </a:r>
+            <a:r>
+              <a:rPr lang="en-US" altLang="zh-CHS" dirty="0"/>
+              <a:t>dispersions</a:t>
+            </a:r>
+            <a:endParaRPr lang="en-US" dirty="0"/>
+          </a:p>
+        </p:txBody>
+      </p:sp>
+      <p:sp>
+        <p:nvSpPr>
+          <p:cNvPr id="3" name="Content Placeholder 2">
+            <a:extLst>
+              <a:ext uri="{FF2B5EF4-FFF2-40B4-BE49-F238E27FC236}">
+                <a16:creationId xmlns:a16="http://schemas.microsoft.com/office/drawing/2014/main" xmlns="" id="{20DC0335-8E99-9549-9D8F-DB310D8E0473}"/>
+              </a:ext>
+            </a:extLst>
+          </p:cNvPr>
+          <p:cNvSpPr>
+            <a:spLocks noGrp="1"/>
+          </p:cNvSpPr>
+          <p:nvPr>
+            <p:ph idx="1"/>
+          </p:nvPr>
+        </p:nvSpPr>
+        <p:spPr/>
+        <p:txBody>
+          <a:bodyPr/>
+          <a:lstStyle/>
+          <a:p>
+            <a:endParaRPr lang="en-US" dirty="0" smtClean="0"/>
+          </a:p>
+          <a:p>
+            <a:endParaRPr lang="en-US" dirty="0"/>
+          </a:p>
+        </p:txBody>
+      </p:sp>
+      <p:sp>
+        <p:nvSpPr>
+          <p:cNvPr id="4" name="Slide Number Placeholder 3">
+            <a:extLst>
+              <a:ext uri="{FF2B5EF4-FFF2-40B4-BE49-F238E27FC236}">
+                <a16:creationId xmlns:a16="http://schemas.microsoft.com/office/drawing/2014/main" xmlns="" id="{DE4280B3-5A14-414E-AA37-5AE72C84C170}"/>
+              </a:ext>
+            </a:extLst>
+          </p:cNvPr>
+          <p:cNvSpPr>
+            <a:spLocks noGrp="1"/>
+          </p:cNvSpPr>
+          <p:nvPr>
+            <p:ph type="sldNum" sz="quarter" idx="12"/>
+          </p:nvPr>
+        </p:nvSpPr>
+        <p:spPr/>
+        <p:txBody>
+          <a:bodyPr/>
+          <a:lstStyle/>
+          <a:p>
+            <a:fld id="{DF9221D8-3A4D-495B-963C-88FDE081B2F3}" type="slidenum">
+              <a:rPr lang="en-US" smtClean="0"/>
+              <a:t>21</a:t>
+            </a:fld>
+            <a:endParaRPr lang="en-US"/>
+          </a:p>
+        </p:txBody>
+      </p:sp>
+      <p:sp>
+        <p:nvSpPr>
+          <p:cNvPr id="5" name="TextBox 4"/>
+          <p:cNvSpPr txBox="1"/>
+          <p:nvPr/>
+        </p:nvSpPr>
+        <p:spPr>
+          <a:xfrm>
+            <a:off x="609600" y="1524000"/>
+            <a:ext cx="8001000" cy="1754327"/>
+          </a:xfrm>
+          <a:prstGeom prst="rect">
+            <a:avLst/>
+          </a:prstGeom>
+          <a:noFill/>
+        </p:spPr>
+        <p:txBody>
+          <a:bodyPr wrap="square" rtlCol="0">
+            <a:spAutoFit/>
+          </a:bodyPr>
+          <a:lstStyle/>
+          <a:p>
+            <a:endParaRPr lang="en-US" dirty="0" smtClean="0"/>
+          </a:p>
+          <a:p>
+            <a:r>
+              <a:rPr lang="en-US" b="1" dirty="0"/>
+              <a:t>SPSS for newbies: how to get mean, median, mode, standard deviation </a:t>
+            </a:r>
+            <a:r>
+              <a:rPr lang="en-US" b="1" dirty="0" err="1" smtClean="0"/>
+              <a:t>etc</a:t>
+            </a:r>
+            <a:r>
+              <a:rPr lang="en-US" altLang="zh-CN" b="1" dirty="0" smtClean="0"/>
+              <a:t>?</a:t>
+            </a:r>
+            <a:endParaRPr lang="en-US" b="1" dirty="0" smtClean="0"/>
+          </a:p>
+          <a:p>
+            <a:endParaRPr lang="en-US" dirty="0"/>
+          </a:p>
+          <a:p>
+            <a:r>
+              <a:rPr lang="en-US" dirty="0" smtClean="0">
+                <a:hlinkClick r:id="rId2"/>
+              </a:rPr>
+              <a:t>https</a:t>
+            </a:r>
+            <a:r>
+              <a:rPr lang="en-US" dirty="0">
+                <a:hlinkClick r:id="rId2"/>
+              </a:rPr>
+              <a:t>://www.youtube.com/watch?v=J3ax2c4s8Tghttps://www.youtube.com/watch?v</a:t>
+            </a:r>
+            <a:r>
+              <a:rPr lang="en-US">
+                <a:hlinkClick r:id="rId2"/>
+              </a:rPr>
+              <a:t>=</a:t>
+            </a:r>
+            <a:r>
+              <a:rPr lang="en-US" smtClean="0">
+                <a:hlinkClick r:id="rId2"/>
+              </a:rPr>
+              <a:t>J3ax2c4s8Tg</a:t>
+            </a:r>
+            <a:endParaRPr lang="en-US" smtClean="0"/>
+          </a:p>
+          <a:p>
+            <a:endParaRPr lang="en-US" dirty="0"/>
+          </a:p>
+        </p:txBody>
+      </p:sp>
+    </p:spTree>
+    <p:extLst>
+      <p:ext uri="{BB962C8B-B14F-4D97-AF65-F5344CB8AC3E}">
+        <p14:creationId xmlns:p14="http://schemas.microsoft.com/office/powerpoint/2010/main" val="3861332895"/>
+      </p:ext>
+    </p:extLst>
+  </p:cSld>
+  <p:clrMapOvr>
+    <a:masterClrMapping/>
+  </p:clrMapOvr>
+</p:sld>
+</file>
+
+<file path=ppt/slides/slide22.xml><?xml version="1.0" encoding="utf-8"?>
+<p:sld xmlns:a="http://schemas.openxmlformats.org/drawingml/2006/main" xmlns:r="http://schemas.openxmlformats.org/officeDocument/2006/relationships" xmlns:p="http://schemas.openxmlformats.org/presentationml/2006/main">
+  <p:cSld>
+    <p:spTree>
+      <p:nvGrpSpPr>
+        <p:cNvPr id="1" name=""/>
+        <p:cNvGrpSpPr/>
+        <p:nvPr/>
+      </p:nvGrpSpPr>
+      <p:grpSpPr>
+        <a:xfrm>
+          <a:off x="0" y="0"/>
+          <a:ext cx="0" cy="0"/>
+          <a:chOff x="0" y="0"/>
+          <a:chExt cx="0" cy="0"/>
+        </a:xfrm>
+      </p:grpSpPr>
+      <p:sp>
+        <p:nvSpPr>
+          <p:cNvPr id="2" name="Title 1">
+            <a:extLst>
+              <a:ext uri="{FF2B5EF4-FFF2-40B4-BE49-F238E27FC236}">
+                <a16:creationId xmlns:a16="http://schemas.microsoft.com/office/drawing/2014/main" xmlns="" id="{3F826242-333B-C847-98E9-923E828C5F24}"/>
+              </a:ext>
+            </a:extLst>
+          </p:cNvPr>
+          <p:cNvSpPr>
+            <a:spLocks noGrp="1"/>
+          </p:cNvSpPr>
+          <p:nvPr>
+            <p:ph type="title"/>
+          </p:nvPr>
+        </p:nvSpPr>
+        <p:spPr/>
+        <p:txBody>
+          <a:bodyPr>
+            <a:normAutofit fontScale="90000"/>
+          </a:bodyPr>
+          <a:lstStyle/>
+          <a:p>
+            <a:r>
+              <a:rPr lang="en-US" altLang="zh-CHS" dirty="0"/>
+              <a:t>[Hands-on]</a:t>
+            </a:r>
+            <a:r>
+              <a:rPr lang="zh-CHS" altLang="en-US" dirty="0"/>
+              <a:t> </a:t>
+            </a:r>
+            <a:r>
+              <a:rPr lang="en-US" altLang="zh-CHS" dirty="0"/>
+              <a:t>using</a:t>
+            </a:r>
+            <a:r>
+              <a:rPr lang="zh-CHS" altLang="en-US" dirty="0"/>
+              <a:t> </a:t>
+            </a:r>
+            <a:r>
+              <a:rPr lang="en-US" altLang="zh-CHS" dirty="0" smtClean="0"/>
+              <a:t>SPSS</a:t>
+            </a:r>
+            <a:r>
+              <a:rPr lang="zh-CHS" altLang="en-US" dirty="0" smtClean="0"/>
+              <a:t> </a:t>
+            </a:r>
+            <a:r>
+              <a:rPr lang="en-US" altLang="zh-CHS" dirty="0"/>
+              <a:t>to</a:t>
+            </a:r>
+            <a:r>
+              <a:rPr lang="zh-CHS" altLang="en-US" dirty="0"/>
+              <a:t> </a:t>
+            </a:r>
+            <a:r>
+              <a:rPr lang="en-US" altLang="zh-CHS" dirty="0"/>
+              <a:t>calculate</a:t>
+            </a:r>
+            <a:r>
+              <a:rPr lang="zh-CHS" altLang="en-US" dirty="0"/>
+              <a:t> </a:t>
+            </a:r>
+            <a:r>
+              <a:rPr lang="en-US" altLang="zh-CHS" dirty="0"/>
+              <a:t>dispersions</a:t>
+            </a:r>
+            <a:endParaRPr lang="en-US" dirty="0"/>
+          </a:p>
+        </p:txBody>
+      </p:sp>
+      <p:sp>
+        <p:nvSpPr>
+          <p:cNvPr id="3" name="Content Placeholder 2">
+            <a:extLst>
+              <a:ext uri="{FF2B5EF4-FFF2-40B4-BE49-F238E27FC236}">
+                <a16:creationId xmlns:a16="http://schemas.microsoft.com/office/drawing/2014/main" xmlns="" id="{20DC0335-8E99-9549-9D8F-DB310D8E0473}"/>
+              </a:ext>
+            </a:extLst>
+          </p:cNvPr>
+          <p:cNvSpPr>
+            <a:spLocks noGrp="1"/>
+          </p:cNvSpPr>
+          <p:nvPr>
+            <p:ph idx="1"/>
+          </p:nvPr>
+        </p:nvSpPr>
+        <p:spPr/>
+        <p:txBody>
+          <a:bodyPr/>
+          <a:lstStyle/>
+          <a:p>
+            <a:endParaRPr lang="en-US" dirty="0" smtClean="0"/>
+          </a:p>
+          <a:p>
+            <a:endParaRPr lang="en-US" dirty="0"/>
+          </a:p>
+        </p:txBody>
+      </p:sp>
+      <p:sp>
+        <p:nvSpPr>
+          <p:cNvPr id="4" name="Slide Number Placeholder 3">
+            <a:extLst>
+              <a:ext uri="{FF2B5EF4-FFF2-40B4-BE49-F238E27FC236}">
+                <a16:creationId xmlns:a16="http://schemas.microsoft.com/office/drawing/2014/main" xmlns="" id="{DE4280B3-5A14-414E-AA37-5AE72C84C170}"/>
+              </a:ext>
+            </a:extLst>
+          </p:cNvPr>
+          <p:cNvSpPr>
+            <a:spLocks noGrp="1"/>
+          </p:cNvSpPr>
+          <p:nvPr>
+            <p:ph type="sldNum" sz="quarter" idx="12"/>
+          </p:nvPr>
+        </p:nvSpPr>
+        <p:spPr/>
+        <p:txBody>
+          <a:bodyPr/>
+          <a:lstStyle/>
+          <a:p>
+            <a:fld id="{DF9221D8-3A4D-495B-963C-88FDE081B2F3}" type="slidenum">
+              <a:rPr lang="en-US" smtClean="0"/>
+              <a:t>22</a:t>
+            </a:fld>
+            <a:endParaRPr lang="en-US"/>
+          </a:p>
+        </p:txBody>
+      </p:sp>
+      <p:pic>
+        <p:nvPicPr>
+          <p:cNvPr id="7" name="Picture 6" descr="Screen Shot 2018-01-30 at 2.13.09 PM.png"/>
+          <p:cNvPicPr>
+            <a:picLocks noChangeAspect="1"/>
+          </p:cNvPicPr>
+          <p:nvPr/>
+        </p:nvPicPr>
+        <p:blipFill>
+          <a:blip r:embed="rId2">
+            <a:extLst>
+              <a:ext uri="{28A0092B-C50C-407E-A947-70E740481C1C}">
+                <a14:useLocalDpi xmlns:a14="http://schemas.microsoft.com/office/drawing/2010/main" val="0"/>
+              </a:ext>
+            </a:extLst>
+          </a:blip>
+          <a:stretch>
+            <a:fillRect/>
+          </a:stretch>
+        </p:blipFill>
+        <p:spPr>
+          <a:xfrm>
+            <a:off x="228600" y="1524000"/>
+            <a:ext cx="8763000" cy="4849852"/>
+          </a:xfrm>
+          <a:prstGeom prst="rect">
+            <a:avLst/>
+          </a:prstGeom>
+        </p:spPr>
+      </p:pic>
+    </p:spTree>
+    <p:extLst>
+      <p:ext uri="{BB962C8B-B14F-4D97-AF65-F5344CB8AC3E}">
+        <p14:creationId xmlns:p14="http://schemas.microsoft.com/office/powerpoint/2010/main" val="1372962868"/>
+      </p:ext>
+    </p:extLst>
+  </p:cSld>
+  <p:clrMapOvr>
+    <a:masterClrMapping/>
+  </p:clrMapOvr>
+</p:sld>
+</file>
+
+<file path=ppt/slides/slide23.xml><?xml version="1.0" encoding="utf-8"?>
+<p:sld xmlns:a="http://schemas.openxmlformats.org/drawingml/2006/main" xmlns:r="http://schemas.openxmlformats.org/officeDocument/2006/relationships" xmlns:p="http://schemas.openxmlformats.org/presentationml/2006/main">
+  <p:cSld>
+    <p:spTree>
+      <p:nvGrpSpPr>
+        <p:cNvPr id="1" name=""/>
+        <p:cNvGrpSpPr/>
+        <p:nvPr/>
+      </p:nvGrpSpPr>
+      <p:grpSpPr>
+        <a:xfrm>
+          <a:off x="0" y="0"/>
+          <a:ext cx="0" cy="0"/>
+          <a:chOff x="0" y="0"/>
+          <a:chExt cx="0" cy="0"/>
+        </a:xfrm>
+      </p:grpSpPr>
+      <p:sp>
+        <p:nvSpPr>
+          <p:cNvPr id="2" name="Title 1">
+            <a:extLst>
+              <a:ext uri="{FF2B5EF4-FFF2-40B4-BE49-F238E27FC236}">
+                <a16:creationId xmlns:a16="http://schemas.microsoft.com/office/drawing/2014/main" xmlns="" id="{3F826242-333B-C847-98E9-923E828C5F24}"/>
+              </a:ext>
+            </a:extLst>
+          </p:cNvPr>
+          <p:cNvSpPr>
+            <a:spLocks noGrp="1"/>
+          </p:cNvSpPr>
+          <p:nvPr>
+            <p:ph type="title"/>
+          </p:nvPr>
+        </p:nvSpPr>
+        <p:spPr/>
+        <p:txBody>
+          <a:bodyPr>
+            <a:normAutofit fontScale="90000"/>
+          </a:bodyPr>
+          <a:lstStyle/>
+          <a:p>
+            <a:r>
+              <a:rPr lang="en-US" altLang="zh-CHS" dirty="0"/>
+              <a:t>[Hands-on]</a:t>
+            </a:r>
+            <a:r>
+              <a:rPr lang="zh-CHS" altLang="en-US" dirty="0"/>
+              <a:t> </a:t>
+            </a:r>
+            <a:r>
+              <a:rPr lang="en-US" altLang="zh-CHS" dirty="0"/>
+              <a:t>using</a:t>
+            </a:r>
+            <a:r>
+              <a:rPr lang="zh-CHS" altLang="en-US" dirty="0"/>
+              <a:t> </a:t>
+            </a:r>
+            <a:r>
+              <a:rPr lang="en-US" altLang="zh-CHS" dirty="0" smtClean="0"/>
+              <a:t>SPSS</a:t>
+            </a:r>
+            <a:r>
+              <a:rPr lang="zh-CHS" altLang="en-US" dirty="0" smtClean="0"/>
+              <a:t> </a:t>
+            </a:r>
+            <a:r>
+              <a:rPr lang="en-US" altLang="zh-CHS" dirty="0"/>
+              <a:t>to</a:t>
+            </a:r>
+            <a:r>
+              <a:rPr lang="zh-CHS" altLang="en-US" dirty="0"/>
+              <a:t> </a:t>
+            </a:r>
+            <a:r>
+              <a:rPr lang="en-US" altLang="zh-CHS" dirty="0"/>
+              <a:t>calculate</a:t>
+            </a:r>
+            <a:r>
+              <a:rPr lang="zh-CHS" altLang="en-US" dirty="0"/>
+              <a:t> </a:t>
+            </a:r>
+            <a:r>
+              <a:rPr lang="en-US" altLang="zh-CHS" dirty="0"/>
+              <a:t>dispersions</a:t>
+            </a:r>
+            <a:endParaRPr lang="en-US" dirty="0"/>
+          </a:p>
+        </p:txBody>
+      </p:sp>
+      <p:sp>
+        <p:nvSpPr>
+          <p:cNvPr id="3" name="Content Placeholder 2">
+            <a:extLst>
+              <a:ext uri="{FF2B5EF4-FFF2-40B4-BE49-F238E27FC236}">
+                <a16:creationId xmlns:a16="http://schemas.microsoft.com/office/drawing/2014/main" xmlns="" id="{20DC0335-8E99-9549-9D8F-DB310D8E0473}"/>
+              </a:ext>
+            </a:extLst>
+          </p:cNvPr>
+          <p:cNvSpPr>
+            <a:spLocks noGrp="1"/>
+          </p:cNvSpPr>
+          <p:nvPr>
+            <p:ph idx="1"/>
+          </p:nvPr>
+        </p:nvSpPr>
+        <p:spPr/>
+        <p:txBody>
+          <a:bodyPr/>
+          <a:lstStyle/>
+          <a:p>
+            <a:endParaRPr lang="en-US" dirty="0" smtClean="0"/>
+          </a:p>
+          <a:p>
+            <a:endParaRPr lang="en-US" dirty="0"/>
+          </a:p>
+        </p:txBody>
+      </p:sp>
+      <p:sp>
+        <p:nvSpPr>
+          <p:cNvPr id="4" name="Slide Number Placeholder 3">
+            <a:extLst>
+              <a:ext uri="{FF2B5EF4-FFF2-40B4-BE49-F238E27FC236}">
+                <a16:creationId xmlns:a16="http://schemas.microsoft.com/office/drawing/2014/main" xmlns="" id="{DE4280B3-5A14-414E-AA37-5AE72C84C170}"/>
+              </a:ext>
+            </a:extLst>
+          </p:cNvPr>
+          <p:cNvSpPr>
+            <a:spLocks noGrp="1"/>
+          </p:cNvSpPr>
+          <p:nvPr>
+            <p:ph type="sldNum" sz="quarter" idx="12"/>
+          </p:nvPr>
+        </p:nvSpPr>
+        <p:spPr/>
+        <p:txBody>
+          <a:bodyPr/>
+          <a:lstStyle/>
+          <a:p>
+            <a:fld id="{DF9221D8-3A4D-495B-963C-88FDE081B2F3}" type="slidenum">
+              <a:rPr lang="en-US" smtClean="0"/>
+              <a:t>23</a:t>
+            </a:fld>
+            <a:endParaRPr lang="en-US"/>
+          </a:p>
+        </p:txBody>
+      </p:sp>
+      <p:sp>
+        <p:nvSpPr>
+          <p:cNvPr id="5" name="TextBox 4"/>
+          <p:cNvSpPr txBox="1"/>
+          <p:nvPr/>
+        </p:nvSpPr>
+        <p:spPr>
+          <a:xfrm>
+            <a:off x="609600" y="1524000"/>
+            <a:ext cx="8001000" cy="2585323"/>
+          </a:xfrm>
+          <a:prstGeom prst="rect">
+            <a:avLst/>
+          </a:prstGeom>
+          <a:noFill/>
+        </p:spPr>
+        <p:txBody>
+          <a:bodyPr wrap="square" rtlCol="0">
+            <a:spAutoFit/>
+          </a:bodyPr>
+          <a:lstStyle/>
+          <a:p>
+            <a:endParaRPr lang="en-US" dirty="0" smtClean="0"/>
+          </a:p>
+          <a:p>
+            <a:r>
+              <a:rPr lang="en-US" b="1" dirty="0"/>
+              <a:t>SPSS </a:t>
+            </a:r>
+            <a:r>
+              <a:rPr lang="en-US" b="1" dirty="0" smtClean="0"/>
+              <a:t>Syntax</a:t>
+            </a:r>
+            <a:endParaRPr lang="en-US" b="1" dirty="0" smtClean="0"/>
+          </a:p>
+          <a:p>
+            <a:endParaRPr lang="en-US" dirty="0"/>
+          </a:p>
+          <a:p>
+            <a:endParaRPr lang="en-US" dirty="0"/>
+          </a:p>
+          <a:p>
+            <a:r>
+              <a:rPr lang="en-US" dirty="0"/>
+              <a:t>DATASET ACTIVATE DataSet0.</a:t>
+            </a:r>
+          </a:p>
+          <a:p>
+            <a:r>
+              <a:rPr lang="en-US" dirty="0"/>
+              <a:t>DESCRIPTIVES VARIABLES=x</a:t>
+            </a:r>
+          </a:p>
+          <a:p>
+            <a:r>
+              <a:rPr lang="en-US" dirty="0"/>
+              <a:t>  /STATISTICS=MEAN SUM STDDEV VARIANCE RANGE MIN MAX SEMEAN KURTOSIS SKEWNESS.</a:t>
+            </a:r>
+          </a:p>
+          <a:p>
+            <a:endParaRPr lang="en-US" dirty="0"/>
+          </a:p>
+        </p:txBody>
+      </p:sp>
+    </p:spTree>
+    <p:extLst>
+      <p:ext uri="{BB962C8B-B14F-4D97-AF65-F5344CB8AC3E}">
+        <p14:creationId xmlns:p14="http://schemas.microsoft.com/office/powerpoint/2010/main" val="2151671074"/>
+      </p:ext>
+    </p:extLst>
+  </p:cSld>
+  <p:clrMapOvr>
+    <a:masterClrMapping/>
+  </p:clrMapOvr>
+</p:sld>
+</file>
+
+<file path=ppt/slides/slide24.xml><?xml version="1.0" encoding="utf-8"?>
+<p:sld xmlns:a="http://schemas.openxmlformats.org/drawingml/2006/main" xmlns:r="http://schemas.openxmlformats.org/officeDocument/2006/relationships" xmlns:p="http://schemas.openxmlformats.org/presentationml/2006/main">
+  <p:cSld>
+    <p:spTree>
+      <p:nvGrpSpPr>
+        <p:cNvPr id="1" name=""/>
+        <p:cNvGrpSpPr/>
+        <p:nvPr/>
+      </p:nvGrpSpPr>
+      <p:grpSpPr>
+        <a:xfrm>
+          <a:off x="0" y="0"/>
+          <a:ext cx="0" cy="0"/>
+          <a:chOff x="0" y="0"/>
+          <a:chExt cx="0" cy="0"/>
+        </a:xfrm>
+      </p:grpSpPr>
+      <p:sp>
+        <p:nvSpPr>
+          <p:cNvPr id="2" name="Title 1">
+            <a:extLst>
+              <a:ext uri="{FF2B5EF4-FFF2-40B4-BE49-F238E27FC236}">
+                <a16:creationId xmlns:a16="http://schemas.microsoft.com/office/drawing/2014/main" xmlns="" id="{3F826242-333B-C847-98E9-923E828C5F24}"/>
+              </a:ext>
+            </a:extLst>
+          </p:cNvPr>
+          <p:cNvSpPr>
+            <a:spLocks noGrp="1"/>
+          </p:cNvSpPr>
+          <p:nvPr>
+            <p:ph type="title"/>
+          </p:nvPr>
+        </p:nvSpPr>
+        <p:spPr/>
+        <p:txBody>
+          <a:bodyPr>
+            <a:normAutofit fontScale="90000"/>
+          </a:bodyPr>
+          <a:lstStyle/>
+          <a:p>
+            <a:r>
+              <a:rPr lang="en-US" altLang="zh-CHS" dirty="0"/>
+              <a:t>[Hands-on]</a:t>
+            </a:r>
+            <a:r>
+              <a:rPr lang="zh-CHS" altLang="en-US" dirty="0"/>
+              <a:t> </a:t>
+            </a:r>
+            <a:r>
+              <a:rPr lang="en-US" altLang="zh-CHS" dirty="0"/>
+              <a:t>using</a:t>
+            </a:r>
+            <a:r>
+              <a:rPr lang="zh-CHS" altLang="en-US" dirty="0"/>
+              <a:t> </a:t>
+            </a:r>
+            <a:r>
+              <a:rPr lang="en-US" altLang="zh-CHS" dirty="0" smtClean="0"/>
+              <a:t>SPSS</a:t>
+            </a:r>
+            <a:r>
+              <a:rPr lang="zh-CHS" altLang="en-US" dirty="0" smtClean="0"/>
+              <a:t> </a:t>
+            </a:r>
+            <a:r>
+              <a:rPr lang="en-US" altLang="zh-CHS" dirty="0"/>
+              <a:t>to</a:t>
+            </a:r>
+            <a:r>
+              <a:rPr lang="zh-CHS" altLang="en-US" dirty="0"/>
+              <a:t> </a:t>
+            </a:r>
+            <a:r>
+              <a:rPr lang="en-US" altLang="zh-CHS" dirty="0"/>
+              <a:t>calculate</a:t>
+            </a:r>
+            <a:r>
+              <a:rPr lang="zh-CHS" altLang="en-US" dirty="0"/>
+              <a:t> </a:t>
+            </a:r>
+            <a:r>
+              <a:rPr lang="en-US" altLang="zh-CHS" dirty="0"/>
+              <a:t>dispersions</a:t>
+            </a:r>
+            <a:endParaRPr lang="en-US" dirty="0"/>
+          </a:p>
+        </p:txBody>
+      </p:sp>
+      <p:sp>
+        <p:nvSpPr>
+          <p:cNvPr id="3" name="Content Placeholder 2">
+            <a:extLst>
+              <a:ext uri="{FF2B5EF4-FFF2-40B4-BE49-F238E27FC236}">
+                <a16:creationId xmlns:a16="http://schemas.microsoft.com/office/drawing/2014/main" xmlns="" id="{20DC0335-8E99-9549-9D8F-DB310D8E0473}"/>
+              </a:ext>
+            </a:extLst>
+          </p:cNvPr>
+          <p:cNvSpPr>
+            <a:spLocks noGrp="1"/>
+          </p:cNvSpPr>
+          <p:nvPr>
+            <p:ph idx="1"/>
+          </p:nvPr>
+        </p:nvSpPr>
+        <p:spPr/>
+        <p:txBody>
+          <a:bodyPr/>
+          <a:lstStyle/>
+          <a:p>
+            <a:endParaRPr lang="en-US" dirty="0" smtClean="0"/>
+          </a:p>
+          <a:p>
+            <a:endParaRPr lang="en-US" dirty="0"/>
+          </a:p>
+        </p:txBody>
+      </p:sp>
+      <p:sp>
+        <p:nvSpPr>
+          <p:cNvPr id="4" name="Slide Number Placeholder 3">
+            <a:extLst>
+              <a:ext uri="{FF2B5EF4-FFF2-40B4-BE49-F238E27FC236}">
+                <a16:creationId xmlns:a16="http://schemas.microsoft.com/office/drawing/2014/main" xmlns="" id="{DE4280B3-5A14-414E-AA37-5AE72C84C170}"/>
+              </a:ext>
+            </a:extLst>
+          </p:cNvPr>
+          <p:cNvSpPr>
+            <a:spLocks noGrp="1"/>
+          </p:cNvSpPr>
+          <p:nvPr>
+            <p:ph type="sldNum" sz="quarter" idx="12"/>
+          </p:nvPr>
+        </p:nvSpPr>
+        <p:spPr/>
+        <p:txBody>
+          <a:bodyPr/>
+          <a:lstStyle/>
+          <a:p>
+            <a:fld id="{DF9221D8-3A4D-495B-963C-88FDE081B2F3}" type="slidenum">
+              <a:rPr lang="en-US" smtClean="0"/>
+              <a:t>24</a:t>
+            </a:fld>
+            <a:endParaRPr lang="en-US"/>
+          </a:p>
+        </p:txBody>
+      </p:sp>
+      <p:sp>
+        <p:nvSpPr>
+          <p:cNvPr id="5" name="TextBox 4"/>
+          <p:cNvSpPr txBox="1"/>
+          <p:nvPr/>
+        </p:nvSpPr>
+        <p:spPr>
+          <a:xfrm>
+            <a:off x="609600" y="1524000"/>
+            <a:ext cx="8001000" cy="923330"/>
+          </a:xfrm>
+          <a:prstGeom prst="rect">
+            <a:avLst/>
+          </a:prstGeom>
+          <a:noFill/>
+        </p:spPr>
+        <p:txBody>
+          <a:bodyPr wrap="square" rtlCol="0">
+            <a:spAutoFit/>
+          </a:bodyPr>
+          <a:lstStyle/>
+          <a:p>
+            <a:endParaRPr lang="en-US" dirty="0" smtClean="0"/>
+          </a:p>
+          <a:p>
+            <a:r>
+              <a:rPr lang="en-US" b="1" dirty="0"/>
+              <a:t>SPSS </a:t>
+            </a:r>
+            <a:r>
+              <a:rPr lang="en-US" b="1" dirty="0" smtClean="0"/>
+              <a:t>Output</a:t>
+            </a:r>
+            <a:endParaRPr lang="en-US" dirty="0"/>
+          </a:p>
+          <a:p>
+            <a:endParaRPr lang="en-US" dirty="0"/>
+          </a:p>
+        </p:txBody>
+      </p:sp>
+      <p:pic>
+        <p:nvPicPr>
+          <p:cNvPr id="6" name="Picture 5" descr="Screen Shot 2018-01-30 at 2.16.52 PM.png"/>
+          <p:cNvPicPr>
+            <a:picLocks noChangeAspect="1"/>
+          </p:cNvPicPr>
+          <p:nvPr/>
+        </p:nvPicPr>
+        <p:blipFill>
+          <a:blip r:embed="rId2">
+            <a:extLst>
+              <a:ext uri="{28A0092B-C50C-407E-A947-70E740481C1C}">
+                <a14:useLocalDpi xmlns:a14="http://schemas.microsoft.com/office/drawing/2010/main" val="0"/>
+              </a:ext>
+            </a:extLst>
+          </a:blip>
+          <a:stretch>
+            <a:fillRect/>
+          </a:stretch>
+        </p:blipFill>
+        <p:spPr>
+          <a:xfrm>
+            <a:off x="31826" y="2590800"/>
+            <a:ext cx="9144000" cy="2617365"/>
+          </a:xfrm>
+          <a:prstGeom prst="rect">
+            <a:avLst/>
+          </a:prstGeom>
+        </p:spPr>
+      </p:pic>
+    </p:spTree>
+    <p:extLst>
+      <p:ext uri="{BB962C8B-B14F-4D97-AF65-F5344CB8AC3E}">
+        <p14:creationId xmlns:p14="http://schemas.microsoft.com/office/powerpoint/2010/main" val="3808300312"/>
+      </p:ext>
+    </p:extLst>
+  </p:cSld>
+  <p:clrMapOvr>
+    <a:masterClrMapping/>
+  </p:clrMapOvr>
+</p:sld>
+</file>
+
+<file path=ppt/slides/slide25.xml><?xml version="1.0" encoding="utf-8"?>
+<p:sld xmlns:a="http://schemas.openxmlformats.org/drawingml/2006/main" xmlns:r="http://schemas.openxmlformats.org/officeDocument/2006/relationships" xmlns:p="http://schemas.openxmlformats.org/presentationml/2006/main">
+  <p:cSld>
+    <p:spTree>
+      <p:nvGrpSpPr>
+        <p:cNvPr id="1" name=""/>
+        <p:cNvGrpSpPr/>
+        <p:nvPr/>
+      </p:nvGrpSpPr>
+      <p:grpSpPr>
+        <a:xfrm>
+          <a:off x="0" y="0"/>
+          <a:ext cx="0" cy="0"/>
+          <a:chOff x="0" y="0"/>
+          <a:chExt cx="0" cy="0"/>
+        </a:xfrm>
+      </p:grpSpPr>
+      <p:sp>
+        <p:nvSpPr>
+          <p:cNvPr id="2" name="Title 1">
+            <a:extLst>
+              <a:ext uri="{FF2B5EF4-FFF2-40B4-BE49-F238E27FC236}">
                 <a16:creationId xmlns:a16="http://schemas.microsoft.com/office/drawing/2014/main" xmlns="" id="{EA0AB704-F3AE-6048-84D9-EDC737AA3035}"/>
               </a:ext>
             </a:extLst>
@@ -9542,7 +10416,7 @@
           <a:p>
             <a:fld id="{DF9221D8-3A4D-495B-963C-88FDE081B2F3}" type="slidenum">
               <a:rPr lang="en-US" smtClean="0"/>
-              <a:t>21</a:t>
+              <a:t>25</a:t>
             </a:fld>
             <a:endParaRPr lang="en-US"/>
           </a:p>

</xml_diff>